<commit_message>
update output files for archive and analysis
</commit_message>
<xml_diff>
--- a/Output/fig2_edrate_localsonly/fig2_knowledgetransfer.pptx
+++ b/Output/fig2_edrate_localsonly/fig2_knowledgetransfer.pptx
@@ -4,6 +4,9 @@
   <p:sldMasterIdLst>
     <p:sldMasterId id="2147483660" r:id="rId1"/>
   </p:sldMasterIdLst>
+  <p:notesMasterIdLst>
+    <p:notesMasterId r:id="rId3"/>
+  </p:notesMasterIdLst>
   <p:sldIdLst>
     <p:sldId id="256" r:id="rId2"/>
   </p:sldIdLst>
@@ -107,7 +110,7 @@
   <p:extLst>
     <p:ext uri="{EFAFB233-063F-42B5-8137-9DF3F51BA10A}">
       <p15:sldGuideLst xmlns:p15="http://schemas.microsoft.com/office/powerpoint/2012/main">
-        <p15:guide id="1" orient="horz" pos="2304" userDrawn="1">
+        <p15:guide id="1" orient="horz" pos="2328" userDrawn="1">
           <p15:clr>
             <a:srgbClr val="A4A3A4"/>
           </p15:clr>
@@ -121,6 +124,439 @@
     </p:ext>
   </p:extLst>
 </p:presentation>
+</file>
+
+<file path=ppt/notesMasters/notesMaster1.xml><?xml version="1.0" encoding="utf-8"?>
+<p:notesMaster xmlns:a="http://schemas.openxmlformats.org/drawingml/2006/main" xmlns:r="http://schemas.openxmlformats.org/officeDocument/2006/relationships" xmlns:p="http://schemas.openxmlformats.org/presentationml/2006/main">
+  <p:cSld>
+    <p:bg>
+      <p:bgRef idx="1001">
+        <a:schemeClr val="bg1"/>
+      </p:bgRef>
+    </p:bg>
+    <p:spTree>
+      <p:nvGrpSpPr>
+        <p:cNvPr id="1" name=""/>
+        <p:cNvGrpSpPr/>
+        <p:nvPr/>
+      </p:nvGrpSpPr>
+      <p:grpSpPr>
+        <a:xfrm>
+          <a:off x="0" y="0"/>
+          <a:ext cx="0" cy="0"/>
+          <a:chOff x="0" y="0"/>
+          <a:chExt cx="0" cy="0"/>
+        </a:xfrm>
+      </p:grpSpPr>
+      <p:sp>
+        <p:nvSpPr>
+          <p:cNvPr id="2" name="Header Placeholder 1"/>
+          <p:cNvSpPr>
+            <a:spLocks noGrp="1"/>
+          </p:cNvSpPr>
+          <p:nvPr>
+            <p:ph type="hdr" sz="quarter"/>
+          </p:nvPr>
+        </p:nvSpPr>
+        <p:spPr>
+          <a:xfrm>
+            <a:off x="0" y="0"/>
+            <a:ext cx="2971800" cy="458788"/>
+          </a:xfrm>
+          <a:prstGeom prst="rect">
+            <a:avLst/>
+          </a:prstGeom>
+        </p:spPr>
+        <p:txBody>
+          <a:bodyPr vert="horz" lIns="91440" tIns="45720" rIns="91440" bIns="45720" rtlCol="0"/>
+          <a:lstStyle>
+            <a:lvl1pPr algn="l">
+              <a:defRPr sz="1200"/>
+            </a:lvl1pPr>
+          </a:lstStyle>
+          <a:p>
+            <a:endParaRPr lang="en-US"/>
+          </a:p>
+        </p:txBody>
+      </p:sp>
+      <p:sp>
+        <p:nvSpPr>
+          <p:cNvPr id="3" name="Date Placeholder 2"/>
+          <p:cNvSpPr>
+            <a:spLocks noGrp="1"/>
+          </p:cNvSpPr>
+          <p:nvPr>
+            <p:ph type="dt" idx="1"/>
+          </p:nvPr>
+        </p:nvSpPr>
+        <p:spPr>
+          <a:xfrm>
+            <a:off x="3884613" y="0"/>
+            <a:ext cx="2971800" cy="458788"/>
+          </a:xfrm>
+          <a:prstGeom prst="rect">
+            <a:avLst/>
+          </a:prstGeom>
+        </p:spPr>
+        <p:txBody>
+          <a:bodyPr vert="horz" lIns="91440" tIns="45720" rIns="91440" bIns="45720" rtlCol="0"/>
+          <a:lstStyle>
+            <a:lvl1pPr algn="r">
+              <a:defRPr sz="1200"/>
+            </a:lvl1pPr>
+          </a:lstStyle>
+          <a:p>
+            <a:fld id="{9838C117-EA5C-3D43-9205-3577E4478F28}" type="datetimeFigureOut">
+              <a:rPr lang="en-US" smtClean="0"/>
+              <a:t>8/30/24</a:t>
+            </a:fld>
+            <a:endParaRPr lang="en-US"/>
+          </a:p>
+        </p:txBody>
+      </p:sp>
+      <p:sp>
+        <p:nvSpPr>
+          <p:cNvPr id="4" name="Slide Image Placeholder 3"/>
+          <p:cNvSpPr>
+            <a:spLocks noGrp="1" noRot="1" noChangeAspect="1"/>
+          </p:cNvSpPr>
+          <p:nvPr>
+            <p:ph type="sldImg" idx="2"/>
+          </p:nvPr>
+        </p:nvSpPr>
+        <p:spPr>
+          <a:xfrm>
+            <a:off x="1885950" y="1143000"/>
+            <a:ext cx="3086100" cy="3086100"/>
+          </a:xfrm>
+          <a:prstGeom prst="rect">
+            <a:avLst/>
+          </a:prstGeom>
+          <a:noFill/>
+          <a:ln w="12700">
+            <a:solidFill>
+              <a:prstClr val="black"/>
+            </a:solidFill>
+          </a:ln>
+        </p:spPr>
+        <p:txBody>
+          <a:bodyPr vert="horz" lIns="91440" tIns="45720" rIns="91440" bIns="45720" rtlCol="0" anchor="ctr"/>
+          <a:lstStyle/>
+          <a:p>
+            <a:endParaRPr lang="en-US"/>
+          </a:p>
+        </p:txBody>
+      </p:sp>
+      <p:sp>
+        <p:nvSpPr>
+          <p:cNvPr id="5" name="Notes Placeholder 4"/>
+          <p:cNvSpPr>
+            <a:spLocks noGrp="1"/>
+          </p:cNvSpPr>
+          <p:nvPr>
+            <p:ph type="body" sz="quarter" idx="3"/>
+          </p:nvPr>
+        </p:nvSpPr>
+        <p:spPr>
+          <a:xfrm>
+            <a:off x="685800" y="4400550"/>
+            <a:ext cx="5486400" cy="3600450"/>
+          </a:xfrm>
+          <a:prstGeom prst="rect">
+            <a:avLst/>
+          </a:prstGeom>
+        </p:spPr>
+        <p:txBody>
+          <a:bodyPr vert="horz" lIns="91440" tIns="45720" rIns="91440" bIns="45720" rtlCol="0"/>
+          <a:lstStyle/>
+          <a:p>
+            <a:pPr lvl="0"/>
+            <a:r>
+              <a:rPr lang="en-US"/>
+              <a:t>Click to edit Master text styles</a:t>
+            </a:r>
+          </a:p>
+          <a:p>
+            <a:pPr lvl="1"/>
+            <a:r>
+              <a:rPr lang="en-US"/>
+              <a:t>Second level</a:t>
+            </a:r>
+          </a:p>
+          <a:p>
+            <a:pPr lvl="2"/>
+            <a:r>
+              <a:rPr lang="en-US"/>
+              <a:t>Third level</a:t>
+            </a:r>
+          </a:p>
+          <a:p>
+            <a:pPr lvl="3"/>
+            <a:r>
+              <a:rPr lang="en-US"/>
+              <a:t>Fourth level</a:t>
+            </a:r>
+          </a:p>
+          <a:p>
+            <a:pPr lvl="4"/>
+            <a:r>
+              <a:rPr lang="en-US"/>
+              <a:t>Fifth level</a:t>
+            </a:r>
+          </a:p>
+        </p:txBody>
+      </p:sp>
+      <p:sp>
+        <p:nvSpPr>
+          <p:cNvPr id="6" name="Footer Placeholder 5"/>
+          <p:cNvSpPr>
+            <a:spLocks noGrp="1"/>
+          </p:cNvSpPr>
+          <p:nvPr>
+            <p:ph type="ftr" sz="quarter" idx="4"/>
+          </p:nvPr>
+        </p:nvSpPr>
+        <p:spPr>
+          <a:xfrm>
+            <a:off x="0" y="8685213"/>
+            <a:ext cx="2971800" cy="458787"/>
+          </a:xfrm>
+          <a:prstGeom prst="rect">
+            <a:avLst/>
+          </a:prstGeom>
+        </p:spPr>
+        <p:txBody>
+          <a:bodyPr vert="horz" lIns="91440" tIns="45720" rIns="91440" bIns="45720" rtlCol="0" anchor="b"/>
+          <a:lstStyle>
+            <a:lvl1pPr algn="l">
+              <a:defRPr sz="1200"/>
+            </a:lvl1pPr>
+          </a:lstStyle>
+          <a:p>
+            <a:endParaRPr lang="en-US"/>
+          </a:p>
+        </p:txBody>
+      </p:sp>
+      <p:sp>
+        <p:nvSpPr>
+          <p:cNvPr id="7" name="Slide Number Placeholder 6"/>
+          <p:cNvSpPr>
+            <a:spLocks noGrp="1"/>
+          </p:cNvSpPr>
+          <p:nvPr>
+            <p:ph type="sldNum" sz="quarter" idx="5"/>
+          </p:nvPr>
+        </p:nvSpPr>
+        <p:spPr>
+          <a:xfrm>
+            <a:off x="3884613" y="8685213"/>
+            <a:ext cx="2971800" cy="458787"/>
+          </a:xfrm>
+          <a:prstGeom prst="rect">
+            <a:avLst/>
+          </a:prstGeom>
+        </p:spPr>
+        <p:txBody>
+          <a:bodyPr vert="horz" lIns="91440" tIns="45720" rIns="91440" bIns="45720" rtlCol="0" anchor="b"/>
+          <a:lstStyle>
+            <a:lvl1pPr algn="r">
+              <a:defRPr sz="1200"/>
+            </a:lvl1pPr>
+          </a:lstStyle>
+          <a:p>
+            <a:fld id="{3A407103-E62B-9149-B0EF-E8C6F341D434}" type="slidenum">
+              <a:rPr lang="en-US" smtClean="0"/>
+              <a:t>‹#›</a:t>
+            </a:fld>
+            <a:endParaRPr lang="en-US"/>
+          </a:p>
+        </p:txBody>
+      </p:sp>
+    </p:spTree>
+    <p:extLst>
+      <p:ext uri="{BB962C8B-B14F-4D97-AF65-F5344CB8AC3E}">
+        <p14:creationId xmlns:p14="http://schemas.microsoft.com/office/powerpoint/2010/main" val="3893408765"/>
+      </p:ext>
+    </p:extLst>
+  </p:cSld>
+  <p:clrMap bg1="lt1" tx1="dk1" bg2="lt2" tx2="dk2" accent1="accent1" accent2="accent2" accent3="accent3" accent4="accent4" accent5="accent5" accent6="accent6" hlink="hlink" folHlink="folHlink"/>
+  <p:notesStyle>
+    <a:lvl1pPr marL="0" algn="l" defTabSz="914400" rtl="0" eaLnBrk="1" latinLnBrk="0" hangingPunct="1">
+      <a:defRPr sz="1200" kern="1200">
+        <a:solidFill>
+          <a:schemeClr val="tx1"/>
+        </a:solidFill>
+        <a:latin typeface="+mn-lt"/>
+        <a:ea typeface="+mn-ea"/>
+        <a:cs typeface="+mn-cs"/>
+      </a:defRPr>
+    </a:lvl1pPr>
+    <a:lvl2pPr marL="457200" algn="l" defTabSz="914400" rtl="0" eaLnBrk="1" latinLnBrk="0" hangingPunct="1">
+      <a:defRPr sz="1200" kern="1200">
+        <a:solidFill>
+          <a:schemeClr val="tx1"/>
+        </a:solidFill>
+        <a:latin typeface="+mn-lt"/>
+        <a:ea typeface="+mn-ea"/>
+        <a:cs typeface="+mn-cs"/>
+      </a:defRPr>
+    </a:lvl2pPr>
+    <a:lvl3pPr marL="914400" algn="l" defTabSz="914400" rtl="0" eaLnBrk="1" latinLnBrk="0" hangingPunct="1">
+      <a:defRPr sz="1200" kern="1200">
+        <a:solidFill>
+          <a:schemeClr val="tx1"/>
+        </a:solidFill>
+        <a:latin typeface="+mn-lt"/>
+        <a:ea typeface="+mn-ea"/>
+        <a:cs typeface="+mn-cs"/>
+      </a:defRPr>
+    </a:lvl3pPr>
+    <a:lvl4pPr marL="1371600" algn="l" defTabSz="914400" rtl="0" eaLnBrk="1" latinLnBrk="0" hangingPunct="1">
+      <a:defRPr sz="1200" kern="1200">
+        <a:solidFill>
+          <a:schemeClr val="tx1"/>
+        </a:solidFill>
+        <a:latin typeface="+mn-lt"/>
+        <a:ea typeface="+mn-ea"/>
+        <a:cs typeface="+mn-cs"/>
+      </a:defRPr>
+    </a:lvl4pPr>
+    <a:lvl5pPr marL="1828800" algn="l" defTabSz="914400" rtl="0" eaLnBrk="1" latinLnBrk="0" hangingPunct="1">
+      <a:defRPr sz="1200" kern="1200">
+        <a:solidFill>
+          <a:schemeClr val="tx1"/>
+        </a:solidFill>
+        <a:latin typeface="+mn-lt"/>
+        <a:ea typeface="+mn-ea"/>
+        <a:cs typeface="+mn-cs"/>
+      </a:defRPr>
+    </a:lvl5pPr>
+    <a:lvl6pPr marL="2286000" algn="l" defTabSz="914400" rtl="0" eaLnBrk="1" latinLnBrk="0" hangingPunct="1">
+      <a:defRPr sz="1200" kern="1200">
+        <a:solidFill>
+          <a:schemeClr val="tx1"/>
+        </a:solidFill>
+        <a:latin typeface="+mn-lt"/>
+        <a:ea typeface="+mn-ea"/>
+        <a:cs typeface="+mn-cs"/>
+      </a:defRPr>
+    </a:lvl6pPr>
+    <a:lvl7pPr marL="2743200" algn="l" defTabSz="914400" rtl="0" eaLnBrk="1" latinLnBrk="0" hangingPunct="1">
+      <a:defRPr sz="1200" kern="1200">
+        <a:solidFill>
+          <a:schemeClr val="tx1"/>
+        </a:solidFill>
+        <a:latin typeface="+mn-lt"/>
+        <a:ea typeface="+mn-ea"/>
+        <a:cs typeface="+mn-cs"/>
+      </a:defRPr>
+    </a:lvl7pPr>
+    <a:lvl8pPr marL="3200400" algn="l" defTabSz="914400" rtl="0" eaLnBrk="1" latinLnBrk="0" hangingPunct="1">
+      <a:defRPr sz="1200" kern="1200">
+        <a:solidFill>
+          <a:schemeClr val="tx1"/>
+        </a:solidFill>
+        <a:latin typeface="+mn-lt"/>
+        <a:ea typeface="+mn-ea"/>
+        <a:cs typeface="+mn-cs"/>
+      </a:defRPr>
+    </a:lvl8pPr>
+    <a:lvl9pPr marL="3657600" algn="l" defTabSz="914400" rtl="0" eaLnBrk="1" latinLnBrk="0" hangingPunct="1">
+      <a:defRPr sz="1200" kern="1200">
+        <a:solidFill>
+          <a:schemeClr val="tx1"/>
+        </a:solidFill>
+        <a:latin typeface="+mn-lt"/>
+        <a:ea typeface="+mn-ea"/>
+        <a:cs typeface="+mn-cs"/>
+      </a:defRPr>
+    </a:lvl9pPr>
+  </p:notesStyle>
+</p:notesMaster>
+</file>
+
+<file path=ppt/notesSlides/notesSlide1.xml><?xml version="1.0" encoding="utf-8"?>
+<p:notes xmlns:a="http://schemas.openxmlformats.org/drawingml/2006/main" xmlns:r="http://schemas.openxmlformats.org/officeDocument/2006/relationships" xmlns:p="http://schemas.openxmlformats.org/presentationml/2006/main">
+  <p:cSld>
+    <p:spTree>
+      <p:nvGrpSpPr>
+        <p:cNvPr id="1" name=""/>
+        <p:cNvGrpSpPr/>
+        <p:nvPr/>
+      </p:nvGrpSpPr>
+      <p:grpSpPr>
+        <a:xfrm>
+          <a:off x="0" y="0"/>
+          <a:ext cx="0" cy="0"/>
+          <a:chOff x="0" y="0"/>
+          <a:chExt cx="0" cy="0"/>
+        </a:xfrm>
+      </p:grpSpPr>
+      <p:sp>
+        <p:nvSpPr>
+          <p:cNvPr id="2" name="Slide Image Placeholder 1"/>
+          <p:cNvSpPr>
+            <a:spLocks noGrp="1" noRot="1" noChangeAspect="1"/>
+          </p:cNvSpPr>
+          <p:nvPr>
+            <p:ph type="sldImg"/>
+          </p:nvPr>
+        </p:nvSpPr>
+        <p:spPr/>
+      </p:sp>
+      <p:sp>
+        <p:nvSpPr>
+          <p:cNvPr id="3" name="Notes Placeholder 2"/>
+          <p:cNvSpPr>
+            <a:spLocks noGrp="1"/>
+          </p:cNvSpPr>
+          <p:nvPr>
+            <p:ph type="body" idx="1"/>
+          </p:nvPr>
+        </p:nvSpPr>
+        <p:spPr/>
+        <p:txBody>
+          <a:bodyPr/>
+          <a:lstStyle/>
+          <a:p>
+            <a:endParaRPr lang="en-US" dirty="0"/>
+          </a:p>
+        </p:txBody>
+      </p:sp>
+      <p:sp>
+        <p:nvSpPr>
+          <p:cNvPr id="4" name="Slide Number Placeholder 3"/>
+          <p:cNvSpPr>
+            <a:spLocks noGrp="1"/>
+          </p:cNvSpPr>
+          <p:nvPr>
+            <p:ph type="sldNum" sz="quarter" idx="5"/>
+          </p:nvPr>
+        </p:nvSpPr>
+        <p:spPr/>
+        <p:txBody>
+          <a:bodyPr/>
+          <a:lstStyle/>
+          <a:p>
+            <a:fld id="{3A407103-E62B-9149-B0EF-E8C6F341D434}" type="slidenum">
+              <a:rPr lang="en-US" smtClean="0"/>
+              <a:t>1</a:t>
+            </a:fld>
+            <a:endParaRPr lang="en-US"/>
+          </a:p>
+        </p:txBody>
+      </p:sp>
+    </p:spTree>
+    <p:extLst>
+      <p:ext uri="{BB962C8B-B14F-4D97-AF65-F5344CB8AC3E}">
+        <p14:creationId xmlns:p14="http://schemas.microsoft.com/office/powerpoint/2010/main" val="4203963383"/>
+      </p:ext>
+    </p:extLst>
+  </p:cSld>
+  <p:clrMapOvr>
+    <a:masterClrMapping/>
+  </p:clrMapOvr>
+</p:notes>
 </file>
 
 <file path=ppt/slideLayouts/slideLayout1.xml><?xml version="1.0" encoding="utf-8"?>
@@ -254,7 +690,7 @@
           <a:p>
             <a:fld id="{57AFAB40-3127-B949-8101-EC3F8F5DCD61}" type="datetimeFigureOut">
               <a:rPr lang="en-US" smtClean="0"/>
-              <a:t>8/23/24</a:t>
+              <a:t>8/30/24</a:t>
             </a:fld>
             <a:endParaRPr lang="en-US"/>
           </a:p>
@@ -424,7 +860,7 @@
           <a:p>
             <a:fld id="{57AFAB40-3127-B949-8101-EC3F8F5DCD61}" type="datetimeFigureOut">
               <a:rPr lang="en-US" smtClean="0"/>
-              <a:t>8/23/24</a:t>
+              <a:t>8/30/24</a:t>
             </a:fld>
             <a:endParaRPr lang="en-US"/>
           </a:p>
@@ -604,7 +1040,7 @@
           <a:p>
             <a:fld id="{57AFAB40-3127-B949-8101-EC3F8F5DCD61}" type="datetimeFigureOut">
               <a:rPr lang="en-US" smtClean="0"/>
-              <a:t>8/23/24</a:t>
+              <a:t>8/30/24</a:t>
             </a:fld>
             <a:endParaRPr lang="en-US"/>
           </a:p>
@@ -774,7 +1210,7 @@
           <a:p>
             <a:fld id="{57AFAB40-3127-B949-8101-EC3F8F5DCD61}" type="datetimeFigureOut">
               <a:rPr lang="en-US" smtClean="0"/>
-              <a:t>8/23/24</a:t>
+              <a:t>8/30/24</a:t>
             </a:fld>
             <a:endParaRPr lang="en-US"/>
           </a:p>
@@ -1020,7 +1456,7 @@
           <a:p>
             <a:fld id="{57AFAB40-3127-B949-8101-EC3F8F5DCD61}" type="datetimeFigureOut">
               <a:rPr lang="en-US" smtClean="0"/>
-              <a:t>8/23/24</a:t>
+              <a:t>8/30/24</a:t>
             </a:fld>
             <a:endParaRPr lang="en-US"/>
           </a:p>
@@ -1252,7 +1688,7 @@
           <a:p>
             <a:fld id="{57AFAB40-3127-B949-8101-EC3F8F5DCD61}" type="datetimeFigureOut">
               <a:rPr lang="en-US" smtClean="0"/>
-              <a:t>8/23/24</a:t>
+              <a:t>8/30/24</a:t>
             </a:fld>
             <a:endParaRPr lang="en-US"/>
           </a:p>
@@ -1619,7 +2055,7 @@
           <a:p>
             <a:fld id="{57AFAB40-3127-B949-8101-EC3F8F5DCD61}" type="datetimeFigureOut">
               <a:rPr lang="en-US" smtClean="0"/>
-              <a:t>8/23/24</a:t>
+              <a:t>8/30/24</a:t>
             </a:fld>
             <a:endParaRPr lang="en-US"/>
           </a:p>
@@ -1737,7 +2173,7 @@
           <a:p>
             <a:fld id="{57AFAB40-3127-B949-8101-EC3F8F5DCD61}" type="datetimeFigureOut">
               <a:rPr lang="en-US" smtClean="0"/>
-              <a:t>8/23/24</a:t>
+              <a:t>8/30/24</a:t>
             </a:fld>
             <a:endParaRPr lang="en-US"/>
           </a:p>
@@ -1832,7 +2268,7 @@
           <a:p>
             <a:fld id="{57AFAB40-3127-B949-8101-EC3F8F5DCD61}" type="datetimeFigureOut">
               <a:rPr lang="en-US" smtClean="0"/>
-              <a:t>8/23/24</a:t>
+              <a:t>8/30/24</a:t>
             </a:fld>
             <a:endParaRPr lang="en-US"/>
           </a:p>
@@ -2109,7 +2545,7 @@
           <a:p>
             <a:fld id="{57AFAB40-3127-B949-8101-EC3F8F5DCD61}" type="datetimeFigureOut">
               <a:rPr lang="en-US" smtClean="0"/>
-              <a:t>8/23/24</a:t>
+              <a:t>8/30/24</a:t>
             </a:fld>
             <a:endParaRPr lang="en-US"/>
           </a:p>
@@ -2366,7 +2802,7 @@
           <a:p>
             <a:fld id="{57AFAB40-3127-B949-8101-EC3F8F5DCD61}" type="datetimeFigureOut">
               <a:rPr lang="en-US" smtClean="0"/>
-              <a:t>8/23/24</a:t>
+              <a:t>8/30/24</a:t>
             </a:fld>
             <a:endParaRPr lang="en-US"/>
           </a:p>
@@ -2579,7 +3015,7 @@
           <a:p>
             <a:fld id="{57AFAB40-3127-B949-8101-EC3F8F5DCD61}" type="datetimeFigureOut">
               <a:rPr lang="en-US" smtClean="0"/>
-              <a:t>8/23/24</a:t>
+              <a:t>8/30/24</a:t>
             </a:fld>
             <a:endParaRPr lang="en-US"/>
           </a:p>
@@ -2986,39 +3422,10 @@
       </p:grpSpPr>
       <p:pic>
         <p:nvPicPr>
-          <p:cNvPr id="9" name="Picture 8">
+          <p:cNvPr id="8" name="Picture 7">
             <a:extLst>
               <a:ext uri="{FF2B5EF4-FFF2-40B4-BE49-F238E27FC236}">
-                <a16:creationId xmlns:a16="http://schemas.microsoft.com/office/drawing/2014/main" id="{9E289346-959C-ED6F-1D21-20AC4F4C8E0C}"/>
-              </a:ext>
-            </a:extLst>
-          </p:cNvPr>
-          <p:cNvPicPr>
-            <a:picLocks noChangeAspect="1"/>
-          </p:cNvPicPr>
-          <p:nvPr/>
-        </p:nvPicPr>
-        <p:blipFill>
-          <a:blip r:embed="rId2"/>
-          <a:srcRect t="15146" r="6720"/>
-          <a:stretch/>
-        </p:blipFill>
-        <p:spPr>
-          <a:xfrm>
-            <a:off x="3657600" y="278417"/>
-            <a:ext cx="3441536" cy="3083748"/>
-          </a:xfrm>
-          <a:prstGeom prst="rect">
-            <a:avLst/>
-          </a:prstGeom>
-        </p:spPr>
-      </p:pic>
-      <p:pic>
-        <p:nvPicPr>
-          <p:cNvPr id="11" name="Picture 10">
-            <a:extLst>
-              <a:ext uri="{FF2B5EF4-FFF2-40B4-BE49-F238E27FC236}">
-                <a16:creationId xmlns:a16="http://schemas.microsoft.com/office/drawing/2014/main" id="{B947DF0D-30D6-E26A-2CD9-E15F89DFF41A}"/>
+                <a16:creationId xmlns:a16="http://schemas.microsoft.com/office/drawing/2014/main" id="{D9673403-3AA3-1BE2-1D15-A3304118A913}"/>
               </a:ext>
             </a:extLst>
           </p:cNvPr>
@@ -3029,13 +3436,13 @@
         </p:nvPicPr>
         <p:blipFill>
           <a:blip r:embed="rId3"/>
-          <a:srcRect t="15146" r="6720"/>
+          <a:srcRect t="15290" r="6318"/>
           <a:stretch/>
         </p:blipFill>
         <p:spPr>
           <a:xfrm>
-            <a:off x="1" y="278418"/>
-            <a:ext cx="3441536" cy="3083747"/>
+            <a:off x="3817746" y="191122"/>
+            <a:ext cx="3381216" cy="3057386"/>
           </a:xfrm>
           <a:prstGeom prst="rect">
             <a:avLst/>
@@ -3044,10 +3451,10 @@
       </p:pic>
       <p:pic>
         <p:nvPicPr>
-          <p:cNvPr id="7" name="Picture 6">
+          <p:cNvPr id="11" name="Picture 10">
             <a:extLst>
               <a:ext uri="{FF2B5EF4-FFF2-40B4-BE49-F238E27FC236}">
-                <a16:creationId xmlns:a16="http://schemas.microsoft.com/office/drawing/2014/main" id="{D9A0CF49-7FD8-2D78-D377-1D4C81018D16}"/>
+                <a16:creationId xmlns:a16="http://schemas.microsoft.com/office/drawing/2014/main" id="{0543B3F7-39A3-3273-F735-7E81294D95F6}"/>
               </a:ext>
             </a:extLst>
           </p:cNvPr>
@@ -3058,13 +3465,71 @@
         </p:nvPicPr>
         <p:blipFill>
           <a:blip r:embed="rId4"/>
-          <a:srcRect t="15146" r="6720"/>
+          <a:srcRect t="15290" r="6274"/>
           <a:stretch/>
         </p:blipFill>
         <p:spPr>
           <a:xfrm>
-            <a:off x="0" y="3384466"/>
-            <a:ext cx="3441536" cy="3083748"/>
+            <a:off x="135980" y="3361358"/>
+            <a:ext cx="3382815" cy="3057387"/>
+          </a:xfrm>
+          <a:prstGeom prst="rect">
+            <a:avLst/>
+          </a:prstGeom>
+        </p:spPr>
+      </p:pic>
+      <p:pic>
+        <p:nvPicPr>
+          <p:cNvPr id="13" name="Picture 12">
+            <a:extLst>
+              <a:ext uri="{FF2B5EF4-FFF2-40B4-BE49-F238E27FC236}">
+                <a16:creationId xmlns:a16="http://schemas.microsoft.com/office/drawing/2014/main" id="{11F42055-0506-0E98-362A-B53ACBA565B7}"/>
+              </a:ext>
+            </a:extLst>
+          </p:cNvPr>
+          <p:cNvPicPr>
+            <a:picLocks noChangeAspect="1"/>
+          </p:cNvPicPr>
+          <p:nvPr/>
+        </p:nvPicPr>
+        <p:blipFill>
+          <a:blip r:embed="rId5"/>
+          <a:srcRect t="15290" r="6274"/>
+          <a:stretch/>
+        </p:blipFill>
+        <p:spPr>
+          <a:xfrm>
+            <a:off x="3816147" y="3361358"/>
+            <a:ext cx="3382815" cy="3057385"/>
+          </a:xfrm>
+          <a:prstGeom prst="rect">
+            <a:avLst/>
+          </a:prstGeom>
+        </p:spPr>
+      </p:pic>
+      <p:pic>
+        <p:nvPicPr>
+          <p:cNvPr id="66" name="Picture 65">
+            <a:extLst>
+              <a:ext uri="{FF2B5EF4-FFF2-40B4-BE49-F238E27FC236}">
+                <a16:creationId xmlns:a16="http://schemas.microsoft.com/office/drawing/2014/main" id="{6607DF14-7168-704D-0D0C-DA4860E1DD0A}"/>
+              </a:ext>
+            </a:extLst>
+          </p:cNvPr>
+          <p:cNvPicPr>
+            <a:picLocks noChangeAspect="1"/>
+          </p:cNvPicPr>
+          <p:nvPr/>
+        </p:nvPicPr>
+        <p:blipFill>
+          <a:blip r:embed="rId6"/>
+          <a:srcRect t="15290" r="6274"/>
+          <a:stretch/>
+        </p:blipFill>
+        <p:spPr>
+          <a:xfrm>
+            <a:off x="135980" y="191122"/>
+            <a:ext cx="3382815" cy="3057388"/>
           </a:xfrm>
           <a:prstGeom prst="rect">
             <a:avLst/>
@@ -3085,8 +3550,8 @@
         </p:nvSpPr>
         <p:spPr>
           <a:xfrm>
-            <a:off x="0" y="1418"/>
-            <a:ext cx="641267" cy="276999"/>
+            <a:off x="0" y="-33751"/>
+            <a:ext cx="1840523" cy="261610"/>
           </a:xfrm>
           <a:prstGeom prst="rect">
             <a:avLst/>
@@ -3100,11 +3565,11 @@
           <a:lstStyle/>
           <a:p>
             <a:r>
-              <a:rPr lang="en-US" sz="1200" dirty="0">
+              <a:rPr lang="en-US" sz="1100" dirty="0">
                 <a:latin typeface="Arial" panose="020B0604020202020204" pitchFamily="34" charset="0"/>
                 <a:cs typeface="Arial" panose="020B0604020202020204" pitchFamily="34" charset="0"/>
               </a:rPr>
-              <a:t>A. </a:t>
+              <a:t>A. Large group </a:t>
             </a:r>
           </a:p>
         </p:txBody>
@@ -3123,8 +3588,8 @@
         </p:nvSpPr>
         <p:spPr>
           <a:xfrm>
-            <a:off x="3621975" y="1418"/>
-            <a:ext cx="641267" cy="276999"/>
+            <a:off x="3692313" y="-33751"/>
+            <a:ext cx="1207933" cy="261610"/>
           </a:xfrm>
           <a:prstGeom prst="rect">
             <a:avLst/>
@@ -3138,11 +3603,11 @@
           <a:lstStyle/>
           <a:p>
             <a:r>
-              <a:rPr lang="en-US" sz="1200" dirty="0">
+              <a:rPr lang="en-US" sz="1100" dirty="0">
                 <a:latin typeface="Arial" panose="020B0604020202020204" pitchFamily="34" charset="0"/>
                 <a:cs typeface="Arial" panose="020B0604020202020204" pitchFamily="34" charset="0"/>
               </a:rPr>
-              <a:t>B. </a:t>
+              <a:t>B. Small group </a:t>
             </a:r>
           </a:p>
         </p:txBody>
@@ -3161,8 +3626,8 @@
         </p:nvSpPr>
         <p:spPr>
           <a:xfrm>
-            <a:off x="0" y="3107467"/>
-            <a:ext cx="641267" cy="276999"/>
+            <a:off x="0" y="3130913"/>
+            <a:ext cx="3786554" cy="261610"/>
           </a:xfrm>
           <a:prstGeom prst="rect">
             <a:avLst/>
@@ -3176,15 +3641,2572 @@
           <a:lstStyle/>
           <a:p>
             <a:r>
-              <a:rPr lang="en-US" sz="1200" dirty="0">
+              <a:rPr lang="en-US" sz="1100" dirty="0">
                 <a:latin typeface="Arial" panose="020B0604020202020204" pitchFamily="34" charset="0"/>
                 <a:cs typeface="Arial" panose="020B0604020202020204" pitchFamily="34" charset="0"/>
               </a:rPr>
-              <a:t>C. </a:t>
-            </a:r>
-          </a:p>
-        </p:txBody>
-      </p:sp>
+              <a:t>C. Small group, 50% reduced interaction probability </a:t>
+            </a:r>
+          </a:p>
+        </p:txBody>
+      </p:sp>
+      <p:sp>
+        <p:nvSpPr>
+          <p:cNvPr id="2" name="TextBox 1">
+            <a:extLst>
+              <a:ext uri="{FF2B5EF4-FFF2-40B4-BE49-F238E27FC236}">
+                <a16:creationId xmlns:a16="http://schemas.microsoft.com/office/drawing/2014/main" id="{D11277DA-1C67-6D82-1189-DBDC17683E50}"/>
+              </a:ext>
+            </a:extLst>
+          </p:cNvPr>
+          <p:cNvSpPr txBox="1"/>
+          <p:nvPr/>
+        </p:nvSpPr>
+        <p:spPr>
+          <a:xfrm>
+            <a:off x="3692313" y="3130913"/>
+            <a:ext cx="3071903" cy="261610"/>
+          </a:xfrm>
+          <a:prstGeom prst="rect">
+            <a:avLst/>
+          </a:prstGeom>
+          <a:noFill/>
+        </p:spPr>
+        <p:txBody>
+          <a:bodyPr wrap="square" rtlCol="0">
+            <a:spAutoFit/>
+          </a:bodyPr>
+          <a:lstStyle/>
+          <a:p>
+            <a:r>
+              <a:rPr lang="en-US" sz="1100" dirty="0">
+                <a:latin typeface="Arial" panose="020B0604020202020204" pitchFamily="34" charset="0"/>
+                <a:cs typeface="Arial" panose="020B0604020202020204" pitchFamily="34" charset="0"/>
+              </a:rPr>
+              <a:t>D. Knowledge transfer probability comparison</a:t>
+            </a:r>
+          </a:p>
+        </p:txBody>
+      </p:sp>
+      <p:sp>
+        <p:nvSpPr>
+          <p:cNvPr id="17" name="TextBox 16">
+            <a:extLst>
+              <a:ext uri="{FF2B5EF4-FFF2-40B4-BE49-F238E27FC236}">
+                <a16:creationId xmlns:a16="http://schemas.microsoft.com/office/drawing/2014/main" id="{ED6E22A5-157E-95E4-B6E3-F021CA2388E8}"/>
+              </a:ext>
+            </a:extLst>
+          </p:cNvPr>
+          <p:cNvSpPr txBox="1"/>
+          <p:nvPr/>
+        </p:nvSpPr>
+        <p:spPr>
+          <a:xfrm>
+            <a:off x="632885" y="6304492"/>
+            <a:ext cx="2180649" cy="261610"/>
+          </a:xfrm>
+          <a:prstGeom prst="rect">
+            <a:avLst/>
+          </a:prstGeom>
+          <a:noFill/>
+        </p:spPr>
+        <p:txBody>
+          <a:bodyPr wrap="square" rtlCol="0">
+            <a:spAutoFit/>
+          </a:bodyPr>
+          <a:lstStyle/>
+          <a:p>
+            <a:r>
+              <a:rPr lang="en-US" sz="1100" dirty="0">
+                <a:latin typeface="Arial" panose="020B0604020202020204" pitchFamily="34" charset="0"/>
+                <a:cs typeface="Arial" panose="020B0604020202020204" pitchFamily="34" charset="0"/>
+              </a:rPr>
+              <a:t>Knowledge transfer probability</a:t>
+            </a:r>
+          </a:p>
+        </p:txBody>
+      </p:sp>
+      <p:sp>
+        <p:nvSpPr>
+          <p:cNvPr id="18" name="TextBox 17">
+            <a:extLst>
+              <a:ext uri="{FF2B5EF4-FFF2-40B4-BE49-F238E27FC236}">
+                <a16:creationId xmlns:a16="http://schemas.microsoft.com/office/drawing/2014/main" id="{BA50783B-1B23-8200-3405-113603783443}"/>
+              </a:ext>
+            </a:extLst>
+          </p:cNvPr>
+          <p:cNvSpPr txBox="1"/>
+          <p:nvPr/>
+        </p:nvSpPr>
+        <p:spPr>
+          <a:xfrm>
+            <a:off x="920792" y="6491068"/>
+            <a:ext cx="1318312" cy="261610"/>
+          </a:xfrm>
+          <a:prstGeom prst="rect">
+            <a:avLst/>
+          </a:prstGeom>
+          <a:noFill/>
+        </p:spPr>
+        <p:txBody>
+          <a:bodyPr wrap="square" rtlCol="0">
+            <a:spAutoFit/>
+          </a:bodyPr>
+          <a:lstStyle/>
+          <a:p>
+            <a:r>
+              <a:rPr lang="en-US" sz="1100" dirty="0">
+                <a:latin typeface="Arial" panose="020B0604020202020204" pitchFamily="34" charset="0"/>
+                <a:cs typeface="Arial" panose="020B0604020202020204" pitchFamily="34" charset="0"/>
+              </a:rPr>
+              <a:t>Large group</a:t>
+            </a:r>
+          </a:p>
+        </p:txBody>
+      </p:sp>
+      <p:sp>
+        <p:nvSpPr>
+          <p:cNvPr id="19" name="TextBox 18">
+            <a:extLst>
+              <a:ext uri="{FF2B5EF4-FFF2-40B4-BE49-F238E27FC236}">
+                <a16:creationId xmlns:a16="http://schemas.microsoft.com/office/drawing/2014/main" id="{DB07690B-2CB0-8144-8796-3F72E130229E}"/>
+              </a:ext>
+            </a:extLst>
+          </p:cNvPr>
+          <p:cNvSpPr txBox="1"/>
+          <p:nvPr/>
+        </p:nvSpPr>
+        <p:spPr>
+          <a:xfrm>
+            <a:off x="920792" y="6677644"/>
+            <a:ext cx="1670005" cy="261610"/>
+          </a:xfrm>
+          <a:prstGeom prst="rect">
+            <a:avLst/>
+          </a:prstGeom>
+          <a:noFill/>
+        </p:spPr>
+        <p:txBody>
+          <a:bodyPr wrap="square" rtlCol="0">
+            <a:spAutoFit/>
+          </a:bodyPr>
+          <a:lstStyle/>
+          <a:p>
+            <a:r>
+              <a:rPr lang="en-US" sz="1100" dirty="0">
+                <a:latin typeface="Arial" panose="020B0604020202020204" pitchFamily="34" charset="0"/>
+                <a:cs typeface="Arial" panose="020B0604020202020204" pitchFamily="34" charset="0"/>
+              </a:rPr>
+              <a:t>Small group</a:t>
+            </a:r>
+          </a:p>
+        </p:txBody>
+      </p:sp>
+      <p:sp>
+        <p:nvSpPr>
+          <p:cNvPr id="20" name="TextBox 19">
+            <a:extLst>
+              <a:ext uri="{FF2B5EF4-FFF2-40B4-BE49-F238E27FC236}">
+                <a16:creationId xmlns:a16="http://schemas.microsoft.com/office/drawing/2014/main" id="{667F11F4-1AA6-406E-A7C2-E722EBEBE004}"/>
+              </a:ext>
+            </a:extLst>
+          </p:cNvPr>
+          <p:cNvSpPr txBox="1"/>
+          <p:nvPr/>
+        </p:nvSpPr>
+        <p:spPr>
+          <a:xfrm>
+            <a:off x="920793" y="6864219"/>
+            <a:ext cx="1834128" cy="430887"/>
+          </a:xfrm>
+          <a:prstGeom prst="rect">
+            <a:avLst/>
+          </a:prstGeom>
+          <a:noFill/>
+        </p:spPr>
+        <p:txBody>
+          <a:bodyPr wrap="square" rtlCol="0">
+            <a:spAutoFit/>
+          </a:bodyPr>
+          <a:lstStyle/>
+          <a:p>
+            <a:r>
+              <a:rPr lang="en-US" sz="1100" dirty="0">
+                <a:latin typeface="Arial" panose="020B0604020202020204" pitchFamily="34" charset="0"/>
+                <a:cs typeface="Arial" panose="020B0604020202020204" pitchFamily="34" charset="0"/>
+              </a:rPr>
+              <a:t>Small group, 50% reduced interaction probability</a:t>
+            </a:r>
+          </a:p>
+        </p:txBody>
+      </p:sp>
+      <p:sp>
+        <p:nvSpPr>
+          <p:cNvPr id="21" name="TextBox 20">
+            <a:extLst>
+              <a:ext uri="{FF2B5EF4-FFF2-40B4-BE49-F238E27FC236}">
+                <a16:creationId xmlns:a16="http://schemas.microsoft.com/office/drawing/2014/main" id="{E1C522D2-DBBF-4042-2966-B1D84D47F641}"/>
+              </a:ext>
+            </a:extLst>
+          </p:cNvPr>
+          <p:cNvSpPr txBox="1"/>
+          <p:nvPr/>
+        </p:nvSpPr>
+        <p:spPr>
+          <a:xfrm>
+            <a:off x="2714578" y="6297811"/>
+            <a:ext cx="579603" cy="261610"/>
+          </a:xfrm>
+          <a:prstGeom prst="rect">
+            <a:avLst/>
+          </a:prstGeom>
+          <a:noFill/>
+        </p:spPr>
+        <p:txBody>
+          <a:bodyPr wrap="square" rtlCol="0">
+            <a:spAutoFit/>
+          </a:bodyPr>
+          <a:lstStyle/>
+          <a:p>
+            <a:r>
+              <a:rPr lang="en-US" sz="1100" dirty="0">
+                <a:latin typeface="Arial" panose="020B0604020202020204" pitchFamily="34" charset="0"/>
+                <a:cs typeface="Arial" panose="020B0604020202020204" pitchFamily="34" charset="0"/>
+              </a:rPr>
+              <a:t>0.00</a:t>
+            </a:r>
+          </a:p>
+        </p:txBody>
+      </p:sp>
+      <p:sp>
+        <p:nvSpPr>
+          <p:cNvPr id="22" name="TextBox 21">
+            <a:extLst>
+              <a:ext uri="{FF2B5EF4-FFF2-40B4-BE49-F238E27FC236}">
+                <a16:creationId xmlns:a16="http://schemas.microsoft.com/office/drawing/2014/main" id="{FD389A68-4CDF-5DA2-715C-C176D97ADC88}"/>
+              </a:ext>
+            </a:extLst>
+          </p:cNvPr>
+          <p:cNvSpPr txBox="1"/>
+          <p:nvPr/>
+        </p:nvSpPr>
+        <p:spPr>
+          <a:xfrm>
+            <a:off x="3068508" y="6297811"/>
+            <a:ext cx="579603" cy="261610"/>
+          </a:xfrm>
+          <a:prstGeom prst="rect">
+            <a:avLst/>
+          </a:prstGeom>
+          <a:noFill/>
+        </p:spPr>
+        <p:txBody>
+          <a:bodyPr wrap="square" rtlCol="0">
+            <a:spAutoFit/>
+          </a:bodyPr>
+          <a:lstStyle/>
+          <a:p>
+            <a:r>
+              <a:rPr lang="en-US" sz="1100" dirty="0">
+                <a:latin typeface="Arial" panose="020B0604020202020204" pitchFamily="34" charset="0"/>
+                <a:cs typeface="Arial" panose="020B0604020202020204" pitchFamily="34" charset="0"/>
+              </a:rPr>
+              <a:t>0.05</a:t>
+            </a:r>
+          </a:p>
+        </p:txBody>
+      </p:sp>
+      <p:sp>
+        <p:nvSpPr>
+          <p:cNvPr id="23" name="TextBox 22">
+            <a:extLst>
+              <a:ext uri="{FF2B5EF4-FFF2-40B4-BE49-F238E27FC236}">
+                <a16:creationId xmlns:a16="http://schemas.microsoft.com/office/drawing/2014/main" id="{D36BBA46-6E67-30D6-A4F3-2C97BFC42CC6}"/>
+              </a:ext>
+            </a:extLst>
+          </p:cNvPr>
+          <p:cNvSpPr txBox="1"/>
+          <p:nvPr/>
+        </p:nvSpPr>
+        <p:spPr>
+          <a:xfrm>
+            <a:off x="3422438" y="6297811"/>
+            <a:ext cx="579603" cy="261610"/>
+          </a:xfrm>
+          <a:prstGeom prst="rect">
+            <a:avLst/>
+          </a:prstGeom>
+          <a:noFill/>
+        </p:spPr>
+        <p:txBody>
+          <a:bodyPr wrap="square" rtlCol="0">
+            <a:spAutoFit/>
+          </a:bodyPr>
+          <a:lstStyle/>
+          <a:p>
+            <a:r>
+              <a:rPr lang="en-US" sz="1100" dirty="0">
+                <a:latin typeface="Arial" panose="020B0604020202020204" pitchFamily="34" charset="0"/>
+                <a:cs typeface="Arial" panose="020B0604020202020204" pitchFamily="34" charset="0"/>
+              </a:rPr>
+              <a:t>0.10</a:t>
+            </a:r>
+          </a:p>
+        </p:txBody>
+      </p:sp>
+      <p:sp>
+        <p:nvSpPr>
+          <p:cNvPr id="24" name="TextBox 23">
+            <a:extLst>
+              <a:ext uri="{FF2B5EF4-FFF2-40B4-BE49-F238E27FC236}">
+                <a16:creationId xmlns:a16="http://schemas.microsoft.com/office/drawing/2014/main" id="{9D2FF0BD-8FC7-3596-E429-8689CC15DD85}"/>
+              </a:ext>
+            </a:extLst>
+          </p:cNvPr>
+          <p:cNvSpPr txBox="1"/>
+          <p:nvPr/>
+        </p:nvSpPr>
+        <p:spPr>
+          <a:xfrm>
+            <a:off x="3776368" y="6297811"/>
+            <a:ext cx="579603" cy="261610"/>
+          </a:xfrm>
+          <a:prstGeom prst="rect">
+            <a:avLst/>
+          </a:prstGeom>
+          <a:noFill/>
+        </p:spPr>
+        <p:txBody>
+          <a:bodyPr wrap="square" rtlCol="0">
+            <a:spAutoFit/>
+          </a:bodyPr>
+          <a:lstStyle/>
+          <a:p>
+            <a:r>
+              <a:rPr lang="en-US" sz="1100" dirty="0">
+                <a:latin typeface="Arial" panose="020B0604020202020204" pitchFamily="34" charset="0"/>
+                <a:cs typeface="Arial" panose="020B0604020202020204" pitchFamily="34" charset="0"/>
+              </a:rPr>
+              <a:t>0.15</a:t>
+            </a:r>
+          </a:p>
+        </p:txBody>
+      </p:sp>
+      <p:sp>
+        <p:nvSpPr>
+          <p:cNvPr id="25" name="TextBox 24">
+            <a:extLst>
+              <a:ext uri="{FF2B5EF4-FFF2-40B4-BE49-F238E27FC236}">
+                <a16:creationId xmlns:a16="http://schemas.microsoft.com/office/drawing/2014/main" id="{3E8484F6-2C9C-B8CF-8857-243023EC3F33}"/>
+              </a:ext>
+            </a:extLst>
+          </p:cNvPr>
+          <p:cNvSpPr txBox="1"/>
+          <p:nvPr/>
+        </p:nvSpPr>
+        <p:spPr>
+          <a:xfrm>
+            <a:off x="4130298" y="6297811"/>
+            <a:ext cx="579603" cy="261610"/>
+          </a:xfrm>
+          <a:prstGeom prst="rect">
+            <a:avLst/>
+          </a:prstGeom>
+          <a:noFill/>
+        </p:spPr>
+        <p:txBody>
+          <a:bodyPr wrap="square" rtlCol="0">
+            <a:spAutoFit/>
+          </a:bodyPr>
+          <a:lstStyle/>
+          <a:p>
+            <a:r>
+              <a:rPr lang="en-US" sz="1100" dirty="0">
+                <a:latin typeface="Arial" panose="020B0604020202020204" pitchFamily="34" charset="0"/>
+                <a:cs typeface="Arial" panose="020B0604020202020204" pitchFamily="34" charset="0"/>
+              </a:rPr>
+              <a:t>0.20</a:t>
+            </a:r>
+          </a:p>
+        </p:txBody>
+      </p:sp>
+      <p:sp>
+        <p:nvSpPr>
+          <p:cNvPr id="26" name="TextBox 25">
+            <a:extLst>
+              <a:ext uri="{FF2B5EF4-FFF2-40B4-BE49-F238E27FC236}">
+                <a16:creationId xmlns:a16="http://schemas.microsoft.com/office/drawing/2014/main" id="{4DFBFB75-7AF9-1A9C-34BC-98092FE9BD40}"/>
+              </a:ext>
+            </a:extLst>
+          </p:cNvPr>
+          <p:cNvSpPr txBox="1"/>
+          <p:nvPr/>
+        </p:nvSpPr>
+        <p:spPr>
+          <a:xfrm>
+            <a:off x="4484228" y="6297811"/>
+            <a:ext cx="579603" cy="261610"/>
+          </a:xfrm>
+          <a:prstGeom prst="rect">
+            <a:avLst/>
+          </a:prstGeom>
+          <a:noFill/>
+        </p:spPr>
+        <p:txBody>
+          <a:bodyPr wrap="square" rtlCol="0">
+            <a:spAutoFit/>
+          </a:bodyPr>
+          <a:lstStyle/>
+          <a:p>
+            <a:r>
+              <a:rPr lang="en-US" sz="1100" dirty="0">
+                <a:latin typeface="Arial" panose="020B0604020202020204" pitchFamily="34" charset="0"/>
+                <a:cs typeface="Arial" panose="020B0604020202020204" pitchFamily="34" charset="0"/>
+              </a:rPr>
+              <a:t>0.25</a:t>
+            </a:r>
+          </a:p>
+        </p:txBody>
+      </p:sp>
+      <p:sp>
+        <p:nvSpPr>
+          <p:cNvPr id="27" name="TextBox 26">
+            <a:extLst>
+              <a:ext uri="{FF2B5EF4-FFF2-40B4-BE49-F238E27FC236}">
+                <a16:creationId xmlns:a16="http://schemas.microsoft.com/office/drawing/2014/main" id="{FA81B47D-FA47-68D9-3EBF-CCA3138FC3BF}"/>
+              </a:ext>
+            </a:extLst>
+          </p:cNvPr>
+          <p:cNvSpPr txBox="1"/>
+          <p:nvPr/>
+        </p:nvSpPr>
+        <p:spPr>
+          <a:xfrm>
+            <a:off x="4838158" y="6297811"/>
+            <a:ext cx="579603" cy="261610"/>
+          </a:xfrm>
+          <a:prstGeom prst="rect">
+            <a:avLst/>
+          </a:prstGeom>
+          <a:noFill/>
+        </p:spPr>
+        <p:txBody>
+          <a:bodyPr wrap="square" rtlCol="0">
+            <a:spAutoFit/>
+          </a:bodyPr>
+          <a:lstStyle/>
+          <a:p>
+            <a:r>
+              <a:rPr lang="en-US" sz="1100" dirty="0">
+                <a:latin typeface="Arial" panose="020B0604020202020204" pitchFamily="34" charset="0"/>
+                <a:cs typeface="Arial" panose="020B0604020202020204" pitchFamily="34" charset="0"/>
+              </a:rPr>
+              <a:t>0.30</a:t>
+            </a:r>
+          </a:p>
+        </p:txBody>
+      </p:sp>
+      <p:sp>
+        <p:nvSpPr>
+          <p:cNvPr id="28" name="TextBox 27">
+            <a:extLst>
+              <a:ext uri="{FF2B5EF4-FFF2-40B4-BE49-F238E27FC236}">
+                <a16:creationId xmlns:a16="http://schemas.microsoft.com/office/drawing/2014/main" id="{8A060DE6-C6B9-944E-23A7-51DD322D2452}"/>
+              </a:ext>
+            </a:extLst>
+          </p:cNvPr>
+          <p:cNvSpPr txBox="1"/>
+          <p:nvPr/>
+        </p:nvSpPr>
+        <p:spPr>
+          <a:xfrm>
+            <a:off x="5192088" y="6297811"/>
+            <a:ext cx="579603" cy="261610"/>
+          </a:xfrm>
+          <a:prstGeom prst="rect">
+            <a:avLst/>
+          </a:prstGeom>
+          <a:noFill/>
+        </p:spPr>
+        <p:txBody>
+          <a:bodyPr wrap="square" rtlCol="0">
+            <a:spAutoFit/>
+          </a:bodyPr>
+          <a:lstStyle/>
+          <a:p>
+            <a:r>
+              <a:rPr lang="en-US" sz="1100" dirty="0">
+                <a:latin typeface="Arial" panose="020B0604020202020204" pitchFamily="34" charset="0"/>
+                <a:cs typeface="Arial" panose="020B0604020202020204" pitchFamily="34" charset="0"/>
+              </a:rPr>
+              <a:t>0.35</a:t>
+            </a:r>
+          </a:p>
+        </p:txBody>
+      </p:sp>
+      <p:sp>
+        <p:nvSpPr>
+          <p:cNvPr id="29" name="TextBox 28">
+            <a:extLst>
+              <a:ext uri="{FF2B5EF4-FFF2-40B4-BE49-F238E27FC236}">
+                <a16:creationId xmlns:a16="http://schemas.microsoft.com/office/drawing/2014/main" id="{4F2C8221-405E-3066-4435-8D7A81AF2517}"/>
+              </a:ext>
+            </a:extLst>
+          </p:cNvPr>
+          <p:cNvSpPr txBox="1"/>
+          <p:nvPr/>
+        </p:nvSpPr>
+        <p:spPr>
+          <a:xfrm>
+            <a:off x="5546018" y="6297811"/>
+            <a:ext cx="579603" cy="261610"/>
+          </a:xfrm>
+          <a:prstGeom prst="rect">
+            <a:avLst/>
+          </a:prstGeom>
+          <a:noFill/>
+        </p:spPr>
+        <p:txBody>
+          <a:bodyPr wrap="square" rtlCol="0">
+            <a:spAutoFit/>
+          </a:bodyPr>
+          <a:lstStyle/>
+          <a:p>
+            <a:r>
+              <a:rPr lang="en-US" sz="1100" dirty="0">
+                <a:latin typeface="Arial" panose="020B0604020202020204" pitchFamily="34" charset="0"/>
+                <a:cs typeface="Arial" panose="020B0604020202020204" pitchFamily="34" charset="0"/>
+              </a:rPr>
+              <a:t>0.40</a:t>
+            </a:r>
+          </a:p>
+        </p:txBody>
+      </p:sp>
+      <p:sp>
+        <p:nvSpPr>
+          <p:cNvPr id="30" name="TextBox 29">
+            <a:extLst>
+              <a:ext uri="{FF2B5EF4-FFF2-40B4-BE49-F238E27FC236}">
+                <a16:creationId xmlns:a16="http://schemas.microsoft.com/office/drawing/2014/main" id="{4D4BE8CB-D5E7-3EBE-247E-BA0FB51C169B}"/>
+              </a:ext>
+            </a:extLst>
+          </p:cNvPr>
+          <p:cNvSpPr txBox="1"/>
+          <p:nvPr/>
+        </p:nvSpPr>
+        <p:spPr>
+          <a:xfrm>
+            <a:off x="5899948" y="6297811"/>
+            <a:ext cx="579603" cy="261610"/>
+          </a:xfrm>
+          <a:prstGeom prst="rect">
+            <a:avLst/>
+          </a:prstGeom>
+          <a:noFill/>
+        </p:spPr>
+        <p:txBody>
+          <a:bodyPr wrap="square" rtlCol="0">
+            <a:spAutoFit/>
+          </a:bodyPr>
+          <a:lstStyle/>
+          <a:p>
+            <a:r>
+              <a:rPr lang="en-US" sz="1100" dirty="0">
+                <a:latin typeface="Arial" panose="020B0604020202020204" pitchFamily="34" charset="0"/>
+                <a:cs typeface="Arial" panose="020B0604020202020204" pitchFamily="34" charset="0"/>
+              </a:rPr>
+              <a:t>0.45</a:t>
+            </a:r>
+          </a:p>
+        </p:txBody>
+      </p:sp>
+      <p:sp>
+        <p:nvSpPr>
+          <p:cNvPr id="31" name="TextBox 30">
+            <a:extLst>
+              <a:ext uri="{FF2B5EF4-FFF2-40B4-BE49-F238E27FC236}">
+                <a16:creationId xmlns:a16="http://schemas.microsoft.com/office/drawing/2014/main" id="{56804463-4DAC-7B12-2717-F05C73A33E29}"/>
+              </a:ext>
+            </a:extLst>
+          </p:cNvPr>
+          <p:cNvSpPr txBox="1"/>
+          <p:nvPr/>
+        </p:nvSpPr>
+        <p:spPr>
+          <a:xfrm>
+            <a:off x="6253879" y="6297811"/>
+            <a:ext cx="579603" cy="261610"/>
+          </a:xfrm>
+          <a:prstGeom prst="rect">
+            <a:avLst/>
+          </a:prstGeom>
+          <a:noFill/>
+        </p:spPr>
+        <p:txBody>
+          <a:bodyPr wrap="square" rtlCol="0">
+            <a:spAutoFit/>
+          </a:bodyPr>
+          <a:lstStyle/>
+          <a:p>
+            <a:r>
+              <a:rPr lang="en-US" sz="1100" dirty="0">
+                <a:latin typeface="Arial" panose="020B0604020202020204" pitchFamily="34" charset="0"/>
+                <a:cs typeface="Arial" panose="020B0604020202020204" pitchFamily="34" charset="0"/>
+              </a:rPr>
+              <a:t>0.50</a:t>
+            </a:r>
+          </a:p>
+        </p:txBody>
+      </p:sp>
+      <p:sp>
+        <p:nvSpPr>
+          <p:cNvPr id="32" name="Rectangle 31">
+            <a:extLst>
+              <a:ext uri="{FF2B5EF4-FFF2-40B4-BE49-F238E27FC236}">
+                <a16:creationId xmlns:a16="http://schemas.microsoft.com/office/drawing/2014/main" id="{CC03A512-ECA7-668A-F267-646A289E4657}"/>
+              </a:ext>
+            </a:extLst>
+          </p:cNvPr>
+          <p:cNvSpPr/>
+          <p:nvPr/>
+        </p:nvSpPr>
+        <p:spPr>
+          <a:xfrm>
+            <a:off x="2766643" y="6552032"/>
+            <a:ext cx="338328" cy="149059"/>
+          </a:xfrm>
+          <a:prstGeom prst="rect">
+            <a:avLst/>
+          </a:prstGeom>
+          <a:solidFill>
+            <a:srgbClr val="D1E3F6"/>
+          </a:solidFill>
+        </p:spPr>
+        <p:style>
+          <a:lnRef idx="2">
+            <a:schemeClr val="accent1">
+              <a:shade val="15000"/>
+            </a:schemeClr>
+          </a:lnRef>
+          <a:fillRef idx="1">
+            <a:schemeClr val="accent1"/>
+          </a:fillRef>
+          <a:effectRef idx="0">
+            <a:schemeClr val="accent1"/>
+          </a:effectRef>
+          <a:fontRef idx="minor">
+            <a:schemeClr val="lt1"/>
+          </a:fontRef>
+        </p:style>
+        <p:txBody>
+          <a:bodyPr rtlCol="0" anchor="ctr"/>
+          <a:lstStyle/>
+          <a:p>
+            <a:pPr algn="ctr"/>
+            <a:endParaRPr lang="en-US"/>
+          </a:p>
+        </p:txBody>
+      </p:sp>
+      <p:sp>
+        <p:nvSpPr>
+          <p:cNvPr id="33" name="Rectangle 32">
+            <a:extLst>
+              <a:ext uri="{FF2B5EF4-FFF2-40B4-BE49-F238E27FC236}">
+                <a16:creationId xmlns:a16="http://schemas.microsoft.com/office/drawing/2014/main" id="{608FD605-DC3F-9F69-7CC3-F307518B23BA}"/>
+              </a:ext>
+            </a:extLst>
+          </p:cNvPr>
+          <p:cNvSpPr/>
+          <p:nvPr/>
+        </p:nvSpPr>
+        <p:spPr>
+          <a:xfrm>
+            <a:off x="3121852" y="6552032"/>
+            <a:ext cx="338328" cy="149059"/>
+          </a:xfrm>
+          <a:prstGeom prst="rect">
+            <a:avLst/>
+          </a:prstGeom>
+          <a:solidFill>
+            <a:srgbClr val="B7D4F1"/>
+          </a:solidFill>
+        </p:spPr>
+        <p:style>
+          <a:lnRef idx="2">
+            <a:schemeClr val="accent1">
+              <a:shade val="15000"/>
+            </a:schemeClr>
+          </a:lnRef>
+          <a:fillRef idx="1">
+            <a:schemeClr val="accent1"/>
+          </a:fillRef>
+          <a:effectRef idx="0">
+            <a:schemeClr val="accent1"/>
+          </a:effectRef>
+          <a:fontRef idx="minor">
+            <a:schemeClr val="lt1"/>
+          </a:fontRef>
+        </p:style>
+        <p:txBody>
+          <a:bodyPr rtlCol="0" anchor="ctr"/>
+          <a:lstStyle/>
+          <a:p>
+            <a:pPr algn="ctr"/>
+            <a:endParaRPr lang="en-US"/>
+          </a:p>
+        </p:txBody>
+      </p:sp>
+      <p:sp>
+        <p:nvSpPr>
+          <p:cNvPr id="34" name="Rectangle 33">
+            <a:extLst>
+              <a:ext uri="{FF2B5EF4-FFF2-40B4-BE49-F238E27FC236}">
+                <a16:creationId xmlns:a16="http://schemas.microsoft.com/office/drawing/2014/main" id="{A364BF69-D652-1433-1F10-A0CE7448EE1A}"/>
+              </a:ext>
+            </a:extLst>
+          </p:cNvPr>
+          <p:cNvSpPr/>
+          <p:nvPr/>
+        </p:nvSpPr>
+        <p:spPr>
+          <a:xfrm>
+            <a:off x="3477061" y="6552032"/>
+            <a:ext cx="338328" cy="149059"/>
+          </a:xfrm>
+          <a:prstGeom prst="rect">
+            <a:avLst/>
+          </a:prstGeom>
+          <a:solidFill>
+            <a:srgbClr val="9EC5EB"/>
+          </a:solidFill>
+        </p:spPr>
+        <p:style>
+          <a:lnRef idx="2">
+            <a:schemeClr val="accent1">
+              <a:shade val="15000"/>
+            </a:schemeClr>
+          </a:lnRef>
+          <a:fillRef idx="1">
+            <a:schemeClr val="accent1"/>
+          </a:fillRef>
+          <a:effectRef idx="0">
+            <a:schemeClr val="accent1"/>
+          </a:effectRef>
+          <a:fontRef idx="minor">
+            <a:schemeClr val="lt1"/>
+          </a:fontRef>
+        </p:style>
+        <p:txBody>
+          <a:bodyPr rtlCol="0" anchor="ctr"/>
+          <a:lstStyle/>
+          <a:p>
+            <a:pPr algn="ctr"/>
+            <a:endParaRPr lang="en-US"/>
+          </a:p>
+        </p:txBody>
+      </p:sp>
+      <p:sp>
+        <p:nvSpPr>
+          <p:cNvPr id="35" name="Rectangle 34">
+            <a:extLst>
+              <a:ext uri="{FF2B5EF4-FFF2-40B4-BE49-F238E27FC236}">
+                <a16:creationId xmlns:a16="http://schemas.microsoft.com/office/drawing/2014/main" id="{A2A21E1F-5B2D-2E8D-2D8D-88BBF9B5D72B}"/>
+              </a:ext>
+            </a:extLst>
+          </p:cNvPr>
+          <p:cNvSpPr/>
+          <p:nvPr/>
+        </p:nvSpPr>
+        <p:spPr>
+          <a:xfrm>
+            <a:off x="3832270" y="6552032"/>
+            <a:ext cx="338328" cy="149059"/>
+          </a:xfrm>
+          <a:prstGeom prst="rect">
+            <a:avLst/>
+          </a:prstGeom>
+          <a:solidFill>
+            <a:srgbClr val="86B6E6"/>
+          </a:solidFill>
+        </p:spPr>
+        <p:style>
+          <a:lnRef idx="2">
+            <a:schemeClr val="accent1">
+              <a:shade val="15000"/>
+            </a:schemeClr>
+          </a:lnRef>
+          <a:fillRef idx="1">
+            <a:schemeClr val="accent1"/>
+          </a:fillRef>
+          <a:effectRef idx="0">
+            <a:schemeClr val="accent1"/>
+          </a:effectRef>
+          <a:fontRef idx="minor">
+            <a:schemeClr val="lt1"/>
+          </a:fontRef>
+        </p:style>
+        <p:txBody>
+          <a:bodyPr rtlCol="0" anchor="ctr"/>
+          <a:lstStyle/>
+          <a:p>
+            <a:pPr algn="ctr"/>
+            <a:endParaRPr lang="en-US"/>
+          </a:p>
+        </p:txBody>
+      </p:sp>
+      <p:sp>
+        <p:nvSpPr>
+          <p:cNvPr id="36" name="Rectangle 35">
+            <a:extLst>
+              <a:ext uri="{FF2B5EF4-FFF2-40B4-BE49-F238E27FC236}">
+                <a16:creationId xmlns:a16="http://schemas.microsoft.com/office/drawing/2014/main" id="{CB8F5596-F60D-57BC-1C7D-C20421D35374}"/>
+              </a:ext>
+            </a:extLst>
+          </p:cNvPr>
+          <p:cNvSpPr/>
+          <p:nvPr/>
+        </p:nvSpPr>
+        <p:spPr>
+          <a:xfrm>
+            <a:off x="4187479" y="6552032"/>
+            <a:ext cx="338328" cy="149059"/>
+          </a:xfrm>
+          <a:prstGeom prst="rect">
+            <a:avLst/>
+          </a:prstGeom>
+          <a:solidFill>
+            <a:srgbClr val="6CA7E0"/>
+          </a:solidFill>
+        </p:spPr>
+        <p:style>
+          <a:lnRef idx="2">
+            <a:schemeClr val="accent1">
+              <a:shade val="15000"/>
+            </a:schemeClr>
+          </a:lnRef>
+          <a:fillRef idx="1">
+            <a:schemeClr val="accent1"/>
+          </a:fillRef>
+          <a:effectRef idx="0">
+            <a:schemeClr val="accent1"/>
+          </a:effectRef>
+          <a:fontRef idx="minor">
+            <a:schemeClr val="lt1"/>
+          </a:fontRef>
+        </p:style>
+        <p:txBody>
+          <a:bodyPr rtlCol="0" anchor="ctr"/>
+          <a:lstStyle/>
+          <a:p>
+            <a:pPr algn="ctr"/>
+            <a:endParaRPr lang="en-US"/>
+          </a:p>
+        </p:txBody>
+      </p:sp>
+      <p:sp>
+        <p:nvSpPr>
+          <p:cNvPr id="37" name="Rectangle 36">
+            <a:extLst>
+              <a:ext uri="{FF2B5EF4-FFF2-40B4-BE49-F238E27FC236}">
+                <a16:creationId xmlns:a16="http://schemas.microsoft.com/office/drawing/2014/main" id="{2A6ABD4C-7CED-898C-CC13-1838914A568C}"/>
+              </a:ext>
+            </a:extLst>
+          </p:cNvPr>
+          <p:cNvSpPr/>
+          <p:nvPr/>
+        </p:nvSpPr>
+        <p:spPr>
+          <a:xfrm>
+            <a:off x="4542688" y="6552032"/>
+            <a:ext cx="338328" cy="149059"/>
+          </a:xfrm>
+          <a:prstGeom prst="rect">
+            <a:avLst/>
+          </a:prstGeom>
+          <a:solidFill>
+            <a:srgbClr val="5397DB"/>
+          </a:solidFill>
+        </p:spPr>
+        <p:style>
+          <a:lnRef idx="2">
+            <a:schemeClr val="accent1">
+              <a:shade val="15000"/>
+            </a:schemeClr>
+          </a:lnRef>
+          <a:fillRef idx="1">
+            <a:schemeClr val="accent1"/>
+          </a:fillRef>
+          <a:effectRef idx="0">
+            <a:schemeClr val="accent1"/>
+          </a:effectRef>
+          <a:fontRef idx="minor">
+            <a:schemeClr val="lt1"/>
+          </a:fontRef>
+        </p:style>
+        <p:txBody>
+          <a:bodyPr rtlCol="0" anchor="ctr"/>
+          <a:lstStyle/>
+          <a:p>
+            <a:pPr algn="ctr"/>
+            <a:endParaRPr lang="en-US"/>
+          </a:p>
+        </p:txBody>
+      </p:sp>
+      <p:sp>
+        <p:nvSpPr>
+          <p:cNvPr id="38" name="Rectangle 37">
+            <a:extLst>
+              <a:ext uri="{FF2B5EF4-FFF2-40B4-BE49-F238E27FC236}">
+                <a16:creationId xmlns:a16="http://schemas.microsoft.com/office/drawing/2014/main" id="{073C0A09-21C1-678A-0F95-359C4B029D5C}"/>
+              </a:ext>
+            </a:extLst>
+          </p:cNvPr>
+          <p:cNvSpPr/>
+          <p:nvPr/>
+        </p:nvSpPr>
+        <p:spPr>
+          <a:xfrm>
+            <a:off x="4897897" y="6552032"/>
+            <a:ext cx="338328" cy="149059"/>
+          </a:xfrm>
+          <a:prstGeom prst="rect">
+            <a:avLst/>
+          </a:prstGeom>
+          <a:solidFill>
+            <a:srgbClr val="3988D5"/>
+          </a:solidFill>
+        </p:spPr>
+        <p:style>
+          <a:lnRef idx="2">
+            <a:schemeClr val="accent1">
+              <a:shade val="15000"/>
+            </a:schemeClr>
+          </a:lnRef>
+          <a:fillRef idx="1">
+            <a:schemeClr val="accent1"/>
+          </a:fillRef>
+          <a:effectRef idx="0">
+            <a:schemeClr val="accent1"/>
+          </a:effectRef>
+          <a:fontRef idx="minor">
+            <a:schemeClr val="lt1"/>
+          </a:fontRef>
+        </p:style>
+        <p:txBody>
+          <a:bodyPr rtlCol="0" anchor="ctr"/>
+          <a:lstStyle/>
+          <a:p>
+            <a:pPr algn="ctr"/>
+            <a:endParaRPr lang="en-US"/>
+          </a:p>
+        </p:txBody>
+      </p:sp>
+      <p:sp>
+        <p:nvSpPr>
+          <p:cNvPr id="39" name="Rectangle 38">
+            <a:extLst>
+              <a:ext uri="{FF2B5EF4-FFF2-40B4-BE49-F238E27FC236}">
+                <a16:creationId xmlns:a16="http://schemas.microsoft.com/office/drawing/2014/main" id="{D12AD00C-2CFC-6741-25B3-278F85A4D063}"/>
+              </a:ext>
+            </a:extLst>
+          </p:cNvPr>
+          <p:cNvSpPr/>
+          <p:nvPr/>
+        </p:nvSpPr>
+        <p:spPr>
+          <a:xfrm>
+            <a:off x="5253106" y="6552032"/>
+            <a:ext cx="338328" cy="149059"/>
+          </a:xfrm>
+          <a:prstGeom prst="rect">
+            <a:avLst/>
+          </a:prstGeom>
+          <a:solidFill>
+            <a:srgbClr val="1F79D0"/>
+          </a:solidFill>
+        </p:spPr>
+        <p:style>
+          <a:lnRef idx="2">
+            <a:schemeClr val="accent1">
+              <a:shade val="15000"/>
+            </a:schemeClr>
+          </a:lnRef>
+          <a:fillRef idx="1">
+            <a:schemeClr val="accent1"/>
+          </a:fillRef>
+          <a:effectRef idx="0">
+            <a:schemeClr val="accent1"/>
+          </a:effectRef>
+          <a:fontRef idx="minor">
+            <a:schemeClr val="lt1"/>
+          </a:fontRef>
+        </p:style>
+        <p:txBody>
+          <a:bodyPr rtlCol="0" anchor="ctr"/>
+          <a:lstStyle/>
+          <a:p>
+            <a:pPr algn="ctr"/>
+            <a:endParaRPr lang="en-US"/>
+          </a:p>
+        </p:txBody>
+      </p:sp>
+      <p:sp>
+        <p:nvSpPr>
+          <p:cNvPr id="40" name="Rectangle 39">
+            <a:extLst>
+              <a:ext uri="{FF2B5EF4-FFF2-40B4-BE49-F238E27FC236}">
+                <a16:creationId xmlns:a16="http://schemas.microsoft.com/office/drawing/2014/main" id="{D3C80A54-8F9A-3EDA-6085-5E402A1B9DC3}"/>
+              </a:ext>
+            </a:extLst>
+          </p:cNvPr>
+          <p:cNvSpPr/>
+          <p:nvPr/>
+        </p:nvSpPr>
+        <p:spPr>
+          <a:xfrm>
+            <a:off x="5608315" y="6552032"/>
+            <a:ext cx="338328" cy="149059"/>
+          </a:xfrm>
+          <a:prstGeom prst="rect">
+            <a:avLst/>
+          </a:prstGeom>
+          <a:solidFill>
+            <a:srgbClr val="1874CE"/>
+          </a:solidFill>
+        </p:spPr>
+        <p:style>
+          <a:lnRef idx="2">
+            <a:schemeClr val="accent1">
+              <a:shade val="15000"/>
+            </a:schemeClr>
+          </a:lnRef>
+          <a:fillRef idx="1">
+            <a:schemeClr val="accent1"/>
+          </a:fillRef>
+          <a:effectRef idx="0">
+            <a:schemeClr val="accent1"/>
+          </a:effectRef>
+          <a:fontRef idx="minor">
+            <a:schemeClr val="lt1"/>
+          </a:fontRef>
+        </p:style>
+        <p:txBody>
+          <a:bodyPr rtlCol="0" anchor="ctr"/>
+          <a:lstStyle/>
+          <a:p>
+            <a:pPr algn="ctr"/>
+            <a:endParaRPr lang="en-US"/>
+          </a:p>
+        </p:txBody>
+      </p:sp>
+      <p:sp>
+        <p:nvSpPr>
+          <p:cNvPr id="41" name="Rectangle 40">
+            <a:extLst>
+              <a:ext uri="{FF2B5EF4-FFF2-40B4-BE49-F238E27FC236}">
+                <a16:creationId xmlns:a16="http://schemas.microsoft.com/office/drawing/2014/main" id="{EBE66883-919C-42C0-2C9A-AE00DB6EC7C6}"/>
+              </a:ext>
+            </a:extLst>
+          </p:cNvPr>
+          <p:cNvSpPr/>
+          <p:nvPr/>
+        </p:nvSpPr>
+        <p:spPr>
+          <a:xfrm>
+            <a:off x="5963524" y="6552032"/>
+            <a:ext cx="338328" cy="149059"/>
+          </a:xfrm>
+          <a:prstGeom prst="rect">
+            <a:avLst/>
+          </a:prstGeom>
+          <a:solidFill>
+            <a:srgbClr val="1874CE"/>
+          </a:solidFill>
+        </p:spPr>
+        <p:style>
+          <a:lnRef idx="2">
+            <a:schemeClr val="accent1">
+              <a:shade val="15000"/>
+            </a:schemeClr>
+          </a:lnRef>
+          <a:fillRef idx="1">
+            <a:schemeClr val="accent1"/>
+          </a:fillRef>
+          <a:effectRef idx="0">
+            <a:schemeClr val="accent1"/>
+          </a:effectRef>
+          <a:fontRef idx="minor">
+            <a:schemeClr val="lt1"/>
+          </a:fontRef>
+        </p:style>
+        <p:txBody>
+          <a:bodyPr rtlCol="0" anchor="ctr"/>
+          <a:lstStyle/>
+          <a:p>
+            <a:pPr algn="ctr"/>
+            <a:endParaRPr lang="en-US"/>
+          </a:p>
+        </p:txBody>
+      </p:sp>
+      <p:sp>
+        <p:nvSpPr>
+          <p:cNvPr id="42" name="Rectangle 41">
+            <a:extLst>
+              <a:ext uri="{FF2B5EF4-FFF2-40B4-BE49-F238E27FC236}">
+                <a16:creationId xmlns:a16="http://schemas.microsoft.com/office/drawing/2014/main" id="{4AEA3244-9D7E-29FB-5143-E3CD7EAA7A16}"/>
+              </a:ext>
+            </a:extLst>
+          </p:cNvPr>
+          <p:cNvSpPr/>
+          <p:nvPr/>
+        </p:nvSpPr>
+        <p:spPr>
+          <a:xfrm>
+            <a:off x="6318730" y="6552032"/>
+            <a:ext cx="338328" cy="149059"/>
+          </a:xfrm>
+          <a:prstGeom prst="rect">
+            <a:avLst/>
+          </a:prstGeom>
+          <a:solidFill>
+            <a:srgbClr val="1874CE"/>
+          </a:solidFill>
+        </p:spPr>
+        <p:style>
+          <a:lnRef idx="2">
+            <a:schemeClr val="accent1">
+              <a:shade val="15000"/>
+            </a:schemeClr>
+          </a:lnRef>
+          <a:fillRef idx="1">
+            <a:schemeClr val="accent1"/>
+          </a:fillRef>
+          <a:effectRef idx="0">
+            <a:schemeClr val="accent1"/>
+          </a:effectRef>
+          <a:fontRef idx="minor">
+            <a:schemeClr val="lt1"/>
+          </a:fontRef>
+        </p:style>
+        <p:txBody>
+          <a:bodyPr rtlCol="0" anchor="ctr"/>
+          <a:lstStyle/>
+          <a:p>
+            <a:pPr algn="ctr"/>
+            <a:endParaRPr lang="en-US"/>
+          </a:p>
+        </p:txBody>
+      </p:sp>
+      <p:sp>
+        <p:nvSpPr>
+          <p:cNvPr id="44" name="Rectangle 43">
+            <a:extLst>
+              <a:ext uri="{FF2B5EF4-FFF2-40B4-BE49-F238E27FC236}">
+                <a16:creationId xmlns:a16="http://schemas.microsoft.com/office/drawing/2014/main" id="{E1E08642-9235-0404-1C14-67D5AF022E9C}"/>
+              </a:ext>
+            </a:extLst>
+          </p:cNvPr>
+          <p:cNvSpPr/>
+          <p:nvPr/>
+        </p:nvSpPr>
+        <p:spPr>
+          <a:xfrm>
+            <a:off x="2766643" y="6757185"/>
+            <a:ext cx="338328" cy="149059"/>
+          </a:xfrm>
+          <a:prstGeom prst="rect">
+            <a:avLst/>
+          </a:prstGeom>
+          <a:solidFill>
+            <a:srgbClr val="F5D4D4"/>
+          </a:solidFill>
+        </p:spPr>
+        <p:style>
+          <a:lnRef idx="2">
+            <a:schemeClr val="accent1">
+              <a:shade val="15000"/>
+            </a:schemeClr>
+          </a:lnRef>
+          <a:fillRef idx="1">
+            <a:schemeClr val="accent1"/>
+          </a:fillRef>
+          <a:effectRef idx="0">
+            <a:schemeClr val="accent1"/>
+          </a:effectRef>
+          <a:fontRef idx="minor">
+            <a:schemeClr val="lt1"/>
+          </a:fontRef>
+        </p:style>
+        <p:txBody>
+          <a:bodyPr rtlCol="0" anchor="ctr"/>
+          <a:lstStyle/>
+          <a:p>
+            <a:pPr algn="ctr"/>
+            <a:endParaRPr lang="en-US"/>
+          </a:p>
+        </p:txBody>
+      </p:sp>
+      <p:sp>
+        <p:nvSpPr>
+          <p:cNvPr id="45" name="Rectangle 44">
+            <a:extLst>
+              <a:ext uri="{FF2B5EF4-FFF2-40B4-BE49-F238E27FC236}">
+                <a16:creationId xmlns:a16="http://schemas.microsoft.com/office/drawing/2014/main" id="{E628D221-0F23-E270-B7C7-A30532B51470}"/>
+              </a:ext>
+            </a:extLst>
+          </p:cNvPr>
+          <p:cNvSpPr/>
+          <p:nvPr/>
+        </p:nvSpPr>
+        <p:spPr>
+          <a:xfrm>
+            <a:off x="3121853" y="6757185"/>
+            <a:ext cx="338328" cy="149059"/>
+          </a:xfrm>
+          <a:prstGeom prst="rect">
+            <a:avLst/>
+          </a:prstGeom>
+          <a:solidFill>
+            <a:srgbClr val="F0BCBC"/>
+          </a:solidFill>
+        </p:spPr>
+        <p:style>
+          <a:lnRef idx="2">
+            <a:schemeClr val="accent1">
+              <a:shade val="15000"/>
+            </a:schemeClr>
+          </a:lnRef>
+          <a:fillRef idx="1">
+            <a:schemeClr val="accent1"/>
+          </a:fillRef>
+          <a:effectRef idx="0">
+            <a:schemeClr val="accent1"/>
+          </a:effectRef>
+          <a:fontRef idx="minor">
+            <a:schemeClr val="lt1"/>
+          </a:fontRef>
+        </p:style>
+        <p:txBody>
+          <a:bodyPr rtlCol="0" anchor="ctr"/>
+          <a:lstStyle/>
+          <a:p>
+            <a:pPr algn="ctr"/>
+            <a:endParaRPr lang="en-US"/>
+          </a:p>
+        </p:txBody>
+      </p:sp>
+      <p:sp>
+        <p:nvSpPr>
+          <p:cNvPr id="46" name="Rectangle 45">
+            <a:extLst>
+              <a:ext uri="{FF2B5EF4-FFF2-40B4-BE49-F238E27FC236}">
+                <a16:creationId xmlns:a16="http://schemas.microsoft.com/office/drawing/2014/main" id="{7F829670-584D-690E-85A4-9A84DA4638D1}"/>
+              </a:ext>
+            </a:extLst>
+          </p:cNvPr>
+          <p:cNvSpPr/>
+          <p:nvPr/>
+        </p:nvSpPr>
+        <p:spPr>
+          <a:xfrm>
+            <a:off x="3477062" y="6757185"/>
+            <a:ext cx="338328" cy="149059"/>
+          </a:xfrm>
+          <a:prstGeom prst="rect">
+            <a:avLst/>
+          </a:prstGeom>
+          <a:solidFill>
+            <a:srgbClr val="EAA4A4"/>
+          </a:solidFill>
+        </p:spPr>
+        <p:style>
+          <a:lnRef idx="2">
+            <a:schemeClr val="accent1">
+              <a:shade val="15000"/>
+            </a:schemeClr>
+          </a:lnRef>
+          <a:fillRef idx="1">
+            <a:schemeClr val="accent1"/>
+          </a:fillRef>
+          <a:effectRef idx="0">
+            <a:schemeClr val="accent1"/>
+          </a:effectRef>
+          <a:fontRef idx="minor">
+            <a:schemeClr val="lt1"/>
+          </a:fontRef>
+        </p:style>
+        <p:txBody>
+          <a:bodyPr rtlCol="0" anchor="ctr"/>
+          <a:lstStyle/>
+          <a:p>
+            <a:pPr algn="ctr"/>
+            <a:endParaRPr lang="en-US"/>
+          </a:p>
+        </p:txBody>
+      </p:sp>
+      <p:sp>
+        <p:nvSpPr>
+          <p:cNvPr id="47" name="Rectangle 46">
+            <a:extLst>
+              <a:ext uri="{FF2B5EF4-FFF2-40B4-BE49-F238E27FC236}">
+                <a16:creationId xmlns:a16="http://schemas.microsoft.com/office/drawing/2014/main" id="{097E85D3-3F15-2110-F7D8-9F2298028D4D}"/>
+              </a:ext>
+            </a:extLst>
+          </p:cNvPr>
+          <p:cNvSpPr/>
+          <p:nvPr/>
+        </p:nvSpPr>
+        <p:spPr>
+          <a:xfrm>
+            <a:off x="3832271" y="6757185"/>
+            <a:ext cx="338328" cy="149059"/>
+          </a:xfrm>
+          <a:prstGeom prst="rect">
+            <a:avLst/>
+          </a:prstGeom>
+          <a:solidFill>
+            <a:srgbClr val="E58D8D"/>
+          </a:solidFill>
+        </p:spPr>
+        <p:style>
+          <a:lnRef idx="2">
+            <a:schemeClr val="accent1">
+              <a:shade val="15000"/>
+            </a:schemeClr>
+          </a:lnRef>
+          <a:fillRef idx="1">
+            <a:schemeClr val="accent1"/>
+          </a:fillRef>
+          <a:effectRef idx="0">
+            <a:schemeClr val="accent1"/>
+          </a:effectRef>
+          <a:fontRef idx="minor">
+            <a:schemeClr val="lt1"/>
+          </a:fontRef>
+        </p:style>
+        <p:txBody>
+          <a:bodyPr rtlCol="0" anchor="ctr"/>
+          <a:lstStyle/>
+          <a:p>
+            <a:pPr algn="ctr"/>
+            <a:endParaRPr lang="en-US"/>
+          </a:p>
+        </p:txBody>
+      </p:sp>
+      <p:sp>
+        <p:nvSpPr>
+          <p:cNvPr id="48" name="Rectangle 47">
+            <a:extLst>
+              <a:ext uri="{FF2B5EF4-FFF2-40B4-BE49-F238E27FC236}">
+                <a16:creationId xmlns:a16="http://schemas.microsoft.com/office/drawing/2014/main" id="{547A6486-9CB5-31D2-031F-7B54689269DA}"/>
+              </a:ext>
+            </a:extLst>
+          </p:cNvPr>
+          <p:cNvSpPr/>
+          <p:nvPr/>
+        </p:nvSpPr>
+        <p:spPr>
+          <a:xfrm>
+            <a:off x="4187480" y="6757185"/>
+            <a:ext cx="338328" cy="149059"/>
+          </a:xfrm>
+          <a:prstGeom prst="rect">
+            <a:avLst/>
+          </a:prstGeom>
+          <a:solidFill>
+            <a:srgbClr val="DF7575"/>
+          </a:solidFill>
+        </p:spPr>
+        <p:style>
+          <a:lnRef idx="2">
+            <a:schemeClr val="accent1">
+              <a:shade val="15000"/>
+            </a:schemeClr>
+          </a:lnRef>
+          <a:fillRef idx="1">
+            <a:schemeClr val="accent1"/>
+          </a:fillRef>
+          <a:effectRef idx="0">
+            <a:schemeClr val="accent1"/>
+          </a:effectRef>
+          <a:fontRef idx="minor">
+            <a:schemeClr val="lt1"/>
+          </a:fontRef>
+        </p:style>
+        <p:txBody>
+          <a:bodyPr rtlCol="0" anchor="ctr"/>
+          <a:lstStyle/>
+          <a:p>
+            <a:pPr algn="ctr"/>
+            <a:endParaRPr lang="en-US"/>
+          </a:p>
+        </p:txBody>
+      </p:sp>
+      <p:sp>
+        <p:nvSpPr>
+          <p:cNvPr id="49" name="Rectangle 48">
+            <a:extLst>
+              <a:ext uri="{FF2B5EF4-FFF2-40B4-BE49-F238E27FC236}">
+                <a16:creationId xmlns:a16="http://schemas.microsoft.com/office/drawing/2014/main" id="{353A0EB9-31E3-4FE9-EBA6-79A4EC0A3860}"/>
+              </a:ext>
+            </a:extLst>
+          </p:cNvPr>
+          <p:cNvSpPr/>
+          <p:nvPr/>
+        </p:nvSpPr>
+        <p:spPr>
+          <a:xfrm>
+            <a:off x="4542689" y="6757185"/>
+            <a:ext cx="338328" cy="149059"/>
+          </a:xfrm>
+          <a:prstGeom prst="rect">
+            <a:avLst/>
+          </a:prstGeom>
+          <a:solidFill>
+            <a:srgbClr val="DA5D5D"/>
+          </a:solidFill>
+        </p:spPr>
+        <p:style>
+          <a:lnRef idx="2">
+            <a:schemeClr val="accent1">
+              <a:shade val="15000"/>
+            </a:schemeClr>
+          </a:lnRef>
+          <a:fillRef idx="1">
+            <a:schemeClr val="accent1"/>
+          </a:fillRef>
+          <a:effectRef idx="0">
+            <a:schemeClr val="accent1"/>
+          </a:effectRef>
+          <a:fontRef idx="minor">
+            <a:schemeClr val="lt1"/>
+          </a:fontRef>
+        </p:style>
+        <p:txBody>
+          <a:bodyPr rtlCol="0" anchor="ctr"/>
+          <a:lstStyle/>
+          <a:p>
+            <a:pPr algn="ctr"/>
+            <a:endParaRPr lang="en-US"/>
+          </a:p>
+        </p:txBody>
+      </p:sp>
+      <p:sp>
+        <p:nvSpPr>
+          <p:cNvPr id="50" name="Rectangle 49">
+            <a:extLst>
+              <a:ext uri="{FF2B5EF4-FFF2-40B4-BE49-F238E27FC236}">
+                <a16:creationId xmlns:a16="http://schemas.microsoft.com/office/drawing/2014/main" id="{1799DC9B-DB15-4ADE-3056-5E8D69AB5615}"/>
+              </a:ext>
+            </a:extLst>
+          </p:cNvPr>
+          <p:cNvSpPr/>
+          <p:nvPr/>
+        </p:nvSpPr>
+        <p:spPr>
+          <a:xfrm>
+            <a:off x="4897898" y="6757185"/>
+            <a:ext cx="338328" cy="149059"/>
+          </a:xfrm>
+          <a:prstGeom prst="rect">
+            <a:avLst/>
+          </a:prstGeom>
+          <a:solidFill>
+            <a:srgbClr val="D44544"/>
+          </a:solidFill>
+        </p:spPr>
+        <p:style>
+          <a:lnRef idx="2">
+            <a:schemeClr val="accent1">
+              <a:shade val="15000"/>
+            </a:schemeClr>
+          </a:lnRef>
+          <a:fillRef idx="1">
+            <a:schemeClr val="accent1"/>
+          </a:fillRef>
+          <a:effectRef idx="0">
+            <a:schemeClr val="accent1"/>
+          </a:effectRef>
+          <a:fontRef idx="minor">
+            <a:schemeClr val="lt1"/>
+          </a:fontRef>
+        </p:style>
+        <p:txBody>
+          <a:bodyPr rtlCol="0" anchor="ctr"/>
+          <a:lstStyle/>
+          <a:p>
+            <a:pPr algn="ctr"/>
+            <a:endParaRPr lang="en-US"/>
+          </a:p>
+        </p:txBody>
+      </p:sp>
+      <p:sp>
+        <p:nvSpPr>
+          <p:cNvPr id="51" name="Rectangle 50">
+            <a:extLst>
+              <a:ext uri="{FF2B5EF4-FFF2-40B4-BE49-F238E27FC236}">
+                <a16:creationId xmlns:a16="http://schemas.microsoft.com/office/drawing/2014/main" id="{CEE8334B-1F44-0A20-D5EE-14CC597E0C3A}"/>
+              </a:ext>
+            </a:extLst>
+          </p:cNvPr>
+          <p:cNvSpPr/>
+          <p:nvPr/>
+        </p:nvSpPr>
+        <p:spPr>
+          <a:xfrm>
+            <a:off x="5253107" y="6757185"/>
+            <a:ext cx="338328" cy="149059"/>
+          </a:xfrm>
+          <a:prstGeom prst="rect">
+            <a:avLst/>
+          </a:prstGeom>
+          <a:solidFill>
+            <a:srgbClr val="CF2D2E"/>
+          </a:solidFill>
+        </p:spPr>
+        <p:style>
+          <a:lnRef idx="2">
+            <a:schemeClr val="accent1">
+              <a:shade val="15000"/>
+            </a:schemeClr>
+          </a:lnRef>
+          <a:fillRef idx="1">
+            <a:schemeClr val="accent1"/>
+          </a:fillRef>
+          <a:effectRef idx="0">
+            <a:schemeClr val="accent1"/>
+          </a:effectRef>
+          <a:fontRef idx="minor">
+            <a:schemeClr val="lt1"/>
+          </a:fontRef>
+        </p:style>
+        <p:txBody>
+          <a:bodyPr rtlCol="0" anchor="ctr"/>
+          <a:lstStyle/>
+          <a:p>
+            <a:pPr algn="ctr"/>
+            <a:endParaRPr lang="en-US"/>
+          </a:p>
+        </p:txBody>
+      </p:sp>
+      <p:sp>
+        <p:nvSpPr>
+          <p:cNvPr id="52" name="Rectangle 51">
+            <a:extLst>
+              <a:ext uri="{FF2B5EF4-FFF2-40B4-BE49-F238E27FC236}">
+                <a16:creationId xmlns:a16="http://schemas.microsoft.com/office/drawing/2014/main" id="{8613684F-831D-2DEA-56DC-820D1583A28B}"/>
+              </a:ext>
+            </a:extLst>
+          </p:cNvPr>
+          <p:cNvSpPr/>
+          <p:nvPr/>
+        </p:nvSpPr>
+        <p:spPr>
+          <a:xfrm>
+            <a:off x="5608316" y="6757185"/>
+            <a:ext cx="338328" cy="149059"/>
+          </a:xfrm>
+          <a:prstGeom prst="rect">
+            <a:avLst/>
+          </a:prstGeom>
+          <a:solidFill>
+            <a:srgbClr val="CD2526"/>
+          </a:solidFill>
+        </p:spPr>
+        <p:style>
+          <a:lnRef idx="2">
+            <a:schemeClr val="accent1">
+              <a:shade val="15000"/>
+            </a:schemeClr>
+          </a:lnRef>
+          <a:fillRef idx="1">
+            <a:schemeClr val="accent1"/>
+          </a:fillRef>
+          <a:effectRef idx="0">
+            <a:schemeClr val="accent1"/>
+          </a:effectRef>
+          <a:fontRef idx="minor">
+            <a:schemeClr val="lt1"/>
+          </a:fontRef>
+        </p:style>
+        <p:txBody>
+          <a:bodyPr rtlCol="0" anchor="ctr"/>
+          <a:lstStyle/>
+          <a:p>
+            <a:pPr algn="ctr"/>
+            <a:endParaRPr lang="en-US"/>
+          </a:p>
+        </p:txBody>
+      </p:sp>
+      <p:sp>
+        <p:nvSpPr>
+          <p:cNvPr id="53" name="Rectangle 52">
+            <a:extLst>
+              <a:ext uri="{FF2B5EF4-FFF2-40B4-BE49-F238E27FC236}">
+                <a16:creationId xmlns:a16="http://schemas.microsoft.com/office/drawing/2014/main" id="{5AE78957-4FDD-8BC2-E3DF-5AEAA9A2AFA7}"/>
+              </a:ext>
+            </a:extLst>
+          </p:cNvPr>
+          <p:cNvSpPr/>
+          <p:nvPr/>
+        </p:nvSpPr>
+        <p:spPr>
+          <a:xfrm>
+            <a:off x="5963525" y="6757185"/>
+            <a:ext cx="338328" cy="149059"/>
+          </a:xfrm>
+          <a:prstGeom prst="rect">
+            <a:avLst/>
+          </a:prstGeom>
+          <a:solidFill>
+            <a:srgbClr val="CD2526"/>
+          </a:solidFill>
+        </p:spPr>
+        <p:style>
+          <a:lnRef idx="2">
+            <a:schemeClr val="accent1">
+              <a:shade val="15000"/>
+            </a:schemeClr>
+          </a:lnRef>
+          <a:fillRef idx="1">
+            <a:schemeClr val="accent1"/>
+          </a:fillRef>
+          <a:effectRef idx="0">
+            <a:schemeClr val="accent1"/>
+          </a:effectRef>
+          <a:fontRef idx="minor">
+            <a:schemeClr val="lt1"/>
+          </a:fontRef>
+        </p:style>
+        <p:txBody>
+          <a:bodyPr rtlCol="0" anchor="ctr"/>
+          <a:lstStyle/>
+          <a:p>
+            <a:pPr algn="ctr"/>
+            <a:endParaRPr lang="en-US"/>
+          </a:p>
+        </p:txBody>
+      </p:sp>
+      <p:sp>
+        <p:nvSpPr>
+          <p:cNvPr id="54" name="Rectangle 53">
+            <a:extLst>
+              <a:ext uri="{FF2B5EF4-FFF2-40B4-BE49-F238E27FC236}">
+                <a16:creationId xmlns:a16="http://schemas.microsoft.com/office/drawing/2014/main" id="{2C3DC539-E246-F95D-4A6A-B4A8F5AF6106}"/>
+              </a:ext>
+            </a:extLst>
+          </p:cNvPr>
+          <p:cNvSpPr/>
+          <p:nvPr/>
+        </p:nvSpPr>
+        <p:spPr>
+          <a:xfrm>
+            <a:off x="6318730" y="6757185"/>
+            <a:ext cx="338328" cy="149059"/>
+          </a:xfrm>
+          <a:prstGeom prst="rect">
+            <a:avLst/>
+          </a:prstGeom>
+          <a:solidFill>
+            <a:srgbClr val="CD2526"/>
+          </a:solidFill>
+        </p:spPr>
+        <p:style>
+          <a:lnRef idx="2">
+            <a:schemeClr val="accent1">
+              <a:shade val="15000"/>
+            </a:schemeClr>
+          </a:lnRef>
+          <a:fillRef idx="1">
+            <a:schemeClr val="accent1"/>
+          </a:fillRef>
+          <a:effectRef idx="0">
+            <a:schemeClr val="accent1"/>
+          </a:effectRef>
+          <a:fontRef idx="minor">
+            <a:schemeClr val="lt1"/>
+          </a:fontRef>
+        </p:style>
+        <p:txBody>
+          <a:bodyPr rtlCol="0" anchor="ctr"/>
+          <a:lstStyle/>
+          <a:p>
+            <a:pPr algn="ctr"/>
+            <a:endParaRPr lang="en-US"/>
+          </a:p>
+        </p:txBody>
+      </p:sp>
+      <p:sp>
+        <p:nvSpPr>
+          <p:cNvPr id="55" name="Rectangle 54">
+            <a:extLst>
+              <a:ext uri="{FF2B5EF4-FFF2-40B4-BE49-F238E27FC236}">
+                <a16:creationId xmlns:a16="http://schemas.microsoft.com/office/drawing/2014/main" id="{FA2E0326-51C3-B60A-99AF-03F3276B4441}"/>
+              </a:ext>
+            </a:extLst>
+          </p:cNvPr>
+          <p:cNvSpPr/>
+          <p:nvPr/>
+        </p:nvSpPr>
+        <p:spPr>
+          <a:xfrm>
+            <a:off x="2766643" y="6962339"/>
+            <a:ext cx="338328" cy="149059"/>
+          </a:xfrm>
+          <a:prstGeom prst="rect">
+            <a:avLst/>
+          </a:prstGeom>
+          <a:solidFill>
+            <a:srgbClr val="FCF0D3"/>
+          </a:solidFill>
+        </p:spPr>
+        <p:style>
+          <a:lnRef idx="2">
+            <a:schemeClr val="accent1">
+              <a:shade val="15000"/>
+            </a:schemeClr>
+          </a:lnRef>
+          <a:fillRef idx="1">
+            <a:schemeClr val="accent1"/>
+          </a:fillRef>
+          <a:effectRef idx="0">
+            <a:schemeClr val="accent1"/>
+          </a:effectRef>
+          <a:fontRef idx="minor">
+            <a:schemeClr val="lt1"/>
+          </a:fontRef>
+        </p:style>
+        <p:txBody>
+          <a:bodyPr rtlCol="0" anchor="ctr"/>
+          <a:lstStyle/>
+          <a:p>
+            <a:pPr algn="ctr"/>
+            <a:endParaRPr lang="en-US"/>
+          </a:p>
+        </p:txBody>
+      </p:sp>
+      <p:sp>
+        <p:nvSpPr>
+          <p:cNvPr id="56" name="Rectangle 55">
+            <a:extLst>
+              <a:ext uri="{FF2B5EF4-FFF2-40B4-BE49-F238E27FC236}">
+                <a16:creationId xmlns:a16="http://schemas.microsoft.com/office/drawing/2014/main" id="{85F56709-DD68-3AD7-589A-AB646BF8D568}"/>
+              </a:ext>
+            </a:extLst>
+          </p:cNvPr>
+          <p:cNvSpPr/>
+          <p:nvPr/>
+        </p:nvSpPr>
+        <p:spPr>
+          <a:xfrm>
+            <a:off x="3121852" y="6962339"/>
+            <a:ext cx="338328" cy="149059"/>
+          </a:xfrm>
+          <a:prstGeom prst="rect">
+            <a:avLst/>
+          </a:prstGeom>
+          <a:solidFill>
+            <a:srgbClr val="FAE8BB"/>
+          </a:solidFill>
+        </p:spPr>
+        <p:style>
+          <a:lnRef idx="2">
+            <a:schemeClr val="accent1">
+              <a:shade val="15000"/>
+            </a:schemeClr>
+          </a:lnRef>
+          <a:fillRef idx="1">
+            <a:schemeClr val="accent1"/>
+          </a:fillRef>
+          <a:effectRef idx="0">
+            <a:schemeClr val="accent1"/>
+          </a:effectRef>
+          <a:fontRef idx="minor">
+            <a:schemeClr val="lt1"/>
+          </a:fontRef>
+        </p:style>
+        <p:txBody>
+          <a:bodyPr rtlCol="0" anchor="ctr"/>
+          <a:lstStyle/>
+          <a:p>
+            <a:pPr algn="ctr"/>
+            <a:endParaRPr lang="en-US"/>
+          </a:p>
+        </p:txBody>
+      </p:sp>
+      <p:sp>
+        <p:nvSpPr>
+          <p:cNvPr id="57" name="Rectangle 56">
+            <a:extLst>
+              <a:ext uri="{FF2B5EF4-FFF2-40B4-BE49-F238E27FC236}">
+                <a16:creationId xmlns:a16="http://schemas.microsoft.com/office/drawing/2014/main" id="{8258EB41-5342-B230-17D3-C8EFF1C8AE45}"/>
+              </a:ext>
+            </a:extLst>
+          </p:cNvPr>
+          <p:cNvSpPr/>
+          <p:nvPr/>
+        </p:nvSpPr>
+        <p:spPr>
+          <a:xfrm>
+            <a:off x="3477061" y="6962339"/>
+            <a:ext cx="338328" cy="149059"/>
+          </a:xfrm>
+          <a:prstGeom prst="rect">
+            <a:avLst/>
+          </a:prstGeom>
+          <a:solidFill>
+            <a:srgbClr val="F8E0A2"/>
+          </a:solidFill>
+        </p:spPr>
+        <p:style>
+          <a:lnRef idx="2">
+            <a:schemeClr val="accent1">
+              <a:shade val="15000"/>
+            </a:schemeClr>
+          </a:lnRef>
+          <a:fillRef idx="1">
+            <a:schemeClr val="accent1"/>
+          </a:fillRef>
+          <a:effectRef idx="0">
+            <a:schemeClr val="accent1"/>
+          </a:effectRef>
+          <a:fontRef idx="minor">
+            <a:schemeClr val="lt1"/>
+          </a:fontRef>
+        </p:style>
+        <p:txBody>
+          <a:bodyPr rtlCol="0" anchor="ctr"/>
+          <a:lstStyle/>
+          <a:p>
+            <a:pPr algn="ctr"/>
+            <a:endParaRPr lang="en-US"/>
+          </a:p>
+        </p:txBody>
+      </p:sp>
+      <p:sp>
+        <p:nvSpPr>
+          <p:cNvPr id="58" name="Rectangle 57">
+            <a:extLst>
+              <a:ext uri="{FF2B5EF4-FFF2-40B4-BE49-F238E27FC236}">
+                <a16:creationId xmlns:a16="http://schemas.microsoft.com/office/drawing/2014/main" id="{20CF49EF-1D9E-C9E1-8359-2BF3C87EA28C}"/>
+              </a:ext>
+            </a:extLst>
+          </p:cNvPr>
+          <p:cNvSpPr/>
+          <p:nvPr/>
+        </p:nvSpPr>
+        <p:spPr>
+          <a:xfrm>
+            <a:off x="3832270" y="6962339"/>
+            <a:ext cx="338328" cy="149059"/>
+          </a:xfrm>
+          <a:prstGeom prst="rect">
+            <a:avLst/>
+          </a:prstGeom>
+          <a:solidFill>
+            <a:srgbClr val="F6D88B"/>
+          </a:solidFill>
+        </p:spPr>
+        <p:style>
+          <a:lnRef idx="2">
+            <a:schemeClr val="accent1">
+              <a:shade val="15000"/>
+            </a:schemeClr>
+          </a:lnRef>
+          <a:fillRef idx="1">
+            <a:schemeClr val="accent1"/>
+          </a:fillRef>
+          <a:effectRef idx="0">
+            <a:schemeClr val="accent1"/>
+          </a:effectRef>
+          <a:fontRef idx="minor">
+            <a:schemeClr val="lt1"/>
+          </a:fontRef>
+        </p:style>
+        <p:txBody>
+          <a:bodyPr rtlCol="0" anchor="ctr"/>
+          <a:lstStyle/>
+          <a:p>
+            <a:pPr algn="ctr"/>
+            <a:endParaRPr lang="en-US"/>
+          </a:p>
+        </p:txBody>
+      </p:sp>
+      <p:sp>
+        <p:nvSpPr>
+          <p:cNvPr id="59" name="Rectangle 58">
+            <a:extLst>
+              <a:ext uri="{FF2B5EF4-FFF2-40B4-BE49-F238E27FC236}">
+                <a16:creationId xmlns:a16="http://schemas.microsoft.com/office/drawing/2014/main" id="{D07407C1-24B1-AB1B-AF52-748CD03B83D9}"/>
+              </a:ext>
+            </a:extLst>
+          </p:cNvPr>
+          <p:cNvSpPr/>
+          <p:nvPr/>
+        </p:nvSpPr>
+        <p:spPr>
+          <a:xfrm>
+            <a:off x="4187479" y="6962339"/>
+            <a:ext cx="338328" cy="149059"/>
+          </a:xfrm>
+          <a:prstGeom prst="rect">
+            <a:avLst/>
+          </a:prstGeom>
+          <a:solidFill>
+            <a:srgbClr val="F4CF73"/>
+          </a:solidFill>
+        </p:spPr>
+        <p:style>
+          <a:lnRef idx="2">
+            <a:schemeClr val="accent1">
+              <a:shade val="15000"/>
+            </a:schemeClr>
+          </a:lnRef>
+          <a:fillRef idx="1">
+            <a:schemeClr val="accent1"/>
+          </a:fillRef>
+          <a:effectRef idx="0">
+            <a:schemeClr val="accent1"/>
+          </a:effectRef>
+          <a:fontRef idx="minor">
+            <a:schemeClr val="lt1"/>
+          </a:fontRef>
+        </p:style>
+        <p:txBody>
+          <a:bodyPr rtlCol="0" anchor="ctr"/>
+          <a:lstStyle/>
+          <a:p>
+            <a:pPr algn="ctr"/>
+            <a:endParaRPr lang="en-US"/>
+          </a:p>
+        </p:txBody>
+      </p:sp>
+      <p:sp>
+        <p:nvSpPr>
+          <p:cNvPr id="60" name="Rectangle 59">
+            <a:extLst>
+              <a:ext uri="{FF2B5EF4-FFF2-40B4-BE49-F238E27FC236}">
+                <a16:creationId xmlns:a16="http://schemas.microsoft.com/office/drawing/2014/main" id="{B10EB7D4-1757-84D8-C512-DD1B440DC84A}"/>
+              </a:ext>
+            </a:extLst>
+          </p:cNvPr>
+          <p:cNvSpPr/>
+          <p:nvPr/>
+        </p:nvSpPr>
+        <p:spPr>
+          <a:xfrm>
+            <a:off x="4542688" y="6962339"/>
+            <a:ext cx="338328" cy="149059"/>
+          </a:xfrm>
+          <a:prstGeom prst="rect">
+            <a:avLst/>
+          </a:prstGeom>
+          <a:solidFill>
+            <a:srgbClr val="F2C75A"/>
+          </a:solidFill>
+        </p:spPr>
+        <p:style>
+          <a:lnRef idx="2">
+            <a:schemeClr val="accent1">
+              <a:shade val="15000"/>
+            </a:schemeClr>
+          </a:lnRef>
+          <a:fillRef idx="1">
+            <a:schemeClr val="accent1"/>
+          </a:fillRef>
+          <a:effectRef idx="0">
+            <a:schemeClr val="accent1"/>
+          </a:effectRef>
+          <a:fontRef idx="minor">
+            <a:schemeClr val="lt1"/>
+          </a:fontRef>
+        </p:style>
+        <p:txBody>
+          <a:bodyPr rtlCol="0" anchor="ctr"/>
+          <a:lstStyle/>
+          <a:p>
+            <a:pPr algn="ctr"/>
+            <a:endParaRPr lang="en-US"/>
+          </a:p>
+        </p:txBody>
+      </p:sp>
+      <p:sp>
+        <p:nvSpPr>
+          <p:cNvPr id="61" name="Rectangle 60">
+            <a:extLst>
+              <a:ext uri="{FF2B5EF4-FFF2-40B4-BE49-F238E27FC236}">
+                <a16:creationId xmlns:a16="http://schemas.microsoft.com/office/drawing/2014/main" id="{D5952AE8-D957-A7DB-ABAB-E3B06D387452}"/>
+              </a:ext>
+            </a:extLst>
+          </p:cNvPr>
+          <p:cNvSpPr/>
+          <p:nvPr/>
+        </p:nvSpPr>
+        <p:spPr>
+          <a:xfrm>
+            <a:off x="4897897" y="6962339"/>
+            <a:ext cx="338328" cy="149059"/>
+          </a:xfrm>
+          <a:prstGeom prst="rect">
+            <a:avLst/>
+          </a:prstGeom>
+          <a:solidFill>
+            <a:srgbClr val="F0BF42"/>
+          </a:solidFill>
+        </p:spPr>
+        <p:style>
+          <a:lnRef idx="2">
+            <a:schemeClr val="accent1">
+              <a:shade val="15000"/>
+            </a:schemeClr>
+          </a:lnRef>
+          <a:fillRef idx="1">
+            <a:schemeClr val="accent1"/>
+          </a:fillRef>
+          <a:effectRef idx="0">
+            <a:schemeClr val="accent1"/>
+          </a:effectRef>
+          <a:fontRef idx="minor">
+            <a:schemeClr val="lt1"/>
+          </a:fontRef>
+        </p:style>
+        <p:txBody>
+          <a:bodyPr rtlCol="0" anchor="ctr"/>
+          <a:lstStyle/>
+          <a:p>
+            <a:pPr algn="ctr"/>
+            <a:endParaRPr lang="en-US"/>
+          </a:p>
+        </p:txBody>
+      </p:sp>
+      <p:sp>
+        <p:nvSpPr>
+          <p:cNvPr id="62" name="Rectangle 61">
+            <a:extLst>
+              <a:ext uri="{FF2B5EF4-FFF2-40B4-BE49-F238E27FC236}">
+                <a16:creationId xmlns:a16="http://schemas.microsoft.com/office/drawing/2014/main" id="{52861646-872A-EF48-373A-3AFF7B319839}"/>
+              </a:ext>
+            </a:extLst>
+          </p:cNvPr>
+          <p:cNvSpPr/>
+          <p:nvPr/>
+        </p:nvSpPr>
+        <p:spPr>
+          <a:xfrm>
+            <a:off x="5253106" y="6962339"/>
+            <a:ext cx="338328" cy="149059"/>
+          </a:xfrm>
+          <a:prstGeom prst="rect">
+            <a:avLst/>
+          </a:prstGeom>
+          <a:solidFill>
+            <a:srgbClr val="EFB72A"/>
+          </a:solidFill>
+        </p:spPr>
+        <p:style>
+          <a:lnRef idx="2">
+            <a:schemeClr val="accent1">
+              <a:shade val="15000"/>
+            </a:schemeClr>
+          </a:lnRef>
+          <a:fillRef idx="1">
+            <a:schemeClr val="accent1"/>
+          </a:fillRef>
+          <a:effectRef idx="0">
+            <a:schemeClr val="accent1"/>
+          </a:effectRef>
+          <a:fontRef idx="minor">
+            <a:schemeClr val="lt1"/>
+          </a:fontRef>
+        </p:style>
+        <p:txBody>
+          <a:bodyPr rtlCol="0" anchor="ctr"/>
+          <a:lstStyle/>
+          <a:p>
+            <a:pPr algn="ctr"/>
+            <a:endParaRPr lang="en-US"/>
+          </a:p>
+        </p:txBody>
+      </p:sp>
+      <p:sp>
+        <p:nvSpPr>
+          <p:cNvPr id="63" name="Rectangle 62">
+            <a:extLst>
+              <a:ext uri="{FF2B5EF4-FFF2-40B4-BE49-F238E27FC236}">
+                <a16:creationId xmlns:a16="http://schemas.microsoft.com/office/drawing/2014/main" id="{64ABA2F4-B6E4-B141-A8B0-BEEC69220872}"/>
+              </a:ext>
+            </a:extLst>
+          </p:cNvPr>
+          <p:cNvSpPr/>
+          <p:nvPr/>
+        </p:nvSpPr>
+        <p:spPr>
+          <a:xfrm>
+            <a:off x="5608315" y="6962339"/>
+            <a:ext cx="338328" cy="149059"/>
+          </a:xfrm>
+          <a:prstGeom prst="rect">
+            <a:avLst/>
+          </a:prstGeom>
+          <a:solidFill>
+            <a:srgbClr val="EEB421"/>
+          </a:solidFill>
+        </p:spPr>
+        <p:style>
+          <a:lnRef idx="2">
+            <a:schemeClr val="accent1">
+              <a:shade val="15000"/>
+            </a:schemeClr>
+          </a:lnRef>
+          <a:fillRef idx="1">
+            <a:schemeClr val="accent1"/>
+          </a:fillRef>
+          <a:effectRef idx="0">
+            <a:schemeClr val="accent1"/>
+          </a:effectRef>
+          <a:fontRef idx="minor">
+            <a:schemeClr val="lt1"/>
+          </a:fontRef>
+        </p:style>
+        <p:txBody>
+          <a:bodyPr rtlCol="0" anchor="ctr"/>
+          <a:lstStyle/>
+          <a:p>
+            <a:pPr algn="ctr"/>
+            <a:endParaRPr lang="en-US"/>
+          </a:p>
+        </p:txBody>
+      </p:sp>
+      <p:sp>
+        <p:nvSpPr>
+          <p:cNvPr id="64" name="Rectangle 63">
+            <a:extLst>
+              <a:ext uri="{FF2B5EF4-FFF2-40B4-BE49-F238E27FC236}">
+                <a16:creationId xmlns:a16="http://schemas.microsoft.com/office/drawing/2014/main" id="{F005D141-7D76-1107-6243-EEFD759322C1}"/>
+              </a:ext>
+            </a:extLst>
+          </p:cNvPr>
+          <p:cNvSpPr/>
+          <p:nvPr/>
+        </p:nvSpPr>
+        <p:spPr>
+          <a:xfrm>
+            <a:off x="5963524" y="6962339"/>
+            <a:ext cx="338328" cy="149059"/>
+          </a:xfrm>
+          <a:prstGeom prst="rect">
+            <a:avLst/>
+          </a:prstGeom>
+          <a:solidFill>
+            <a:srgbClr val="EEB421"/>
+          </a:solidFill>
+        </p:spPr>
+        <p:style>
+          <a:lnRef idx="2">
+            <a:schemeClr val="accent1">
+              <a:shade val="15000"/>
+            </a:schemeClr>
+          </a:lnRef>
+          <a:fillRef idx="1">
+            <a:schemeClr val="accent1"/>
+          </a:fillRef>
+          <a:effectRef idx="0">
+            <a:schemeClr val="accent1"/>
+          </a:effectRef>
+          <a:fontRef idx="minor">
+            <a:schemeClr val="lt1"/>
+          </a:fontRef>
+        </p:style>
+        <p:txBody>
+          <a:bodyPr rtlCol="0" anchor="ctr"/>
+          <a:lstStyle/>
+          <a:p>
+            <a:pPr algn="ctr"/>
+            <a:endParaRPr lang="en-US"/>
+          </a:p>
+        </p:txBody>
+      </p:sp>
+      <p:sp>
+        <p:nvSpPr>
+          <p:cNvPr id="65" name="Rectangle 64">
+            <a:extLst>
+              <a:ext uri="{FF2B5EF4-FFF2-40B4-BE49-F238E27FC236}">
+                <a16:creationId xmlns:a16="http://schemas.microsoft.com/office/drawing/2014/main" id="{CACDC3A1-EFC9-8E4B-6D69-0ED23BB41361}"/>
+              </a:ext>
+            </a:extLst>
+          </p:cNvPr>
+          <p:cNvSpPr/>
+          <p:nvPr/>
+        </p:nvSpPr>
+        <p:spPr>
+          <a:xfrm>
+            <a:off x="6318730" y="6962339"/>
+            <a:ext cx="338328" cy="149059"/>
+          </a:xfrm>
+          <a:prstGeom prst="rect">
+            <a:avLst/>
+          </a:prstGeom>
+          <a:solidFill>
+            <a:srgbClr val="EEB421"/>
+          </a:solidFill>
+        </p:spPr>
+        <p:style>
+          <a:lnRef idx="2">
+            <a:schemeClr val="accent1">
+              <a:shade val="15000"/>
+            </a:schemeClr>
+          </a:lnRef>
+          <a:fillRef idx="1">
+            <a:schemeClr val="accent1"/>
+          </a:fillRef>
+          <a:effectRef idx="0">
+            <a:schemeClr val="accent1"/>
+          </a:effectRef>
+          <a:fontRef idx="minor">
+            <a:schemeClr val="lt1"/>
+          </a:fontRef>
+        </p:style>
+        <p:txBody>
+          <a:bodyPr rtlCol="0" anchor="ctr"/>
+          <a:lstStyle/>
+          <a:p>
+            <a:pPr algn="ctr"/>
+            <a:endParaRPr lang="en-US"/>
+          </a:p>
+        </p:txBody>
+      </p:sp>
+      <p:sp>
+        <p:nvSpPr>
+          <p:cNvPr id="72" name="TextBox 71">
+            <a:extLst>
+              <a:ext uri="{FF2B5EF4-FFF2-40B4-BE49-F238E27FC236}">
+                <a16:creationId xmlns:a16="http://schemas.microsoft.com/office/drawing/2014/main" id="{21A3AC19-6B08-805C-F9DA-01BFC0D098FF}"/>
+              </a:ext>
+            </a:extLst>
+          </p:cNvPr>
+          <p:cNvSpPr txBox="1"/>
+          <p:nvPr/>
+        </p:nvSpPr>
+        <p:spPr>
+          <a:xfrm>
+            <a:off x="6558007" y="5151093"/>
+            <a:ext cx="579603" cy="246221"/>
+          </a:xfrm>
+          <a:prstGeom prst="rect">
+            <a:avLst/>
+          </a:prstGeom>
+          <a:noFill/>
+        </p:spPr>
+        <p:txBody>
+          <a:bodyPr wrap="square" rtlCol="0">
+            <a:spAutoFit/>
+          </a:bodyPr>
+          <a:lstStyle/>
+          <a:p>
+            <a:r>
+              <a:rPr lang="en-US" sz="1000" dirty="0">
+                <a:latin typeface="Arial" panose="020B0604020202020204" pitchFamily="34" charset="0"/>
+                <a:cs typeface="Arial" panose="020B0604020202020204" pitchFamily="34" charset="0"/>
+              </a:rPr>
+              <a:t>0.00</a:t>
+            </a:r>
+          </a:p>
+        </p:txBody>
+      </p:sp>
+      <p:sp>
+        <p:nvSpPr>
+          <p:cNvPr id="73" name="TextBox 72">
+            <a:extLst>
+              <a:ext uri="{FF2B5EF4-FFF2-40B4-BE49-F238E27FC236}">
+                <a16:creationId xmlns:a16="http://schemas.microsoft.com/office/drawing/2014/main" id="{FBF0C2FC-B0BB-B450-FD4A-1244F2ECECE9}"/>
+              </a:ext>
+            </a:extLst>
+          </p:cNvPr>
+          <p:cNvSpPr txBox="1"/>
+          <p:nvPr/>
+        </p:nvSpPr>
+        <p:spPr>
+          <a:xfrm>
+            <a:off x="6239247" y="4543505"/>
+            <a:ext cx="579603" cy="246221"/>
+          </a:xfrm>
+          <a:prstGeom prst="rect">
+            <a:avLst/>
+          </a:prstGeom>
+          <a:noFill/>
+        </p:spPr>
+        <p:txBody>
+          <a:bodyPr wrap="square" rtlCol="0">
+            <a:spAutoFit/>
+          </a:bodyPr>
+          <a:lstStyle/>
+          <a:p>
+            <a:r>
+              <a:rPr lang="en-US" sz="1000" dirty="0">
+                <a:latin typeface="Arial" panose="020B0604020202020204" pitchFamily="34" charset="0"/>
+                <a:cs typeface="Arial" panose="020B0604020202020204" pitchFamily="34" charset="0"/>
+              </a:rPr>
+              <a:t>0.10</a:t>
+            </a:r>
+          </a:p>
+        </p:txBody>
+      </p:sp>
+      <p:sp>
+        <p:nvSpPr>
+          <p:cNvPr id="74" name="TextBox 73">
+            <a:extLst>
+              <a:ext uri="{FF2B5EF4-FFF2-40B4-BE49-F238E27FC236}">
+                <a16:creationId xmlns:a16="http://schemas.microsoft.com/office/drawing/2014/main" id="{E4031573-2A0D-9B92-DA6B-D6108EA26E74}"/>
+              </a:ext>
+            </a:extLst>
+          </p:cNvPr>
+          <p:cNvSpPr txBox="1"/>
+          <p:nvPr/>
+        </p:nvSpPr>
+        <p:spPr>
+          <a:xfrm>
+            <a:off x="5718507" y="3821997"/>
+            <a:ext cx="579603" cy="246221"/>
+          </a:xfrm>
+          <a:prstGeom prst="rect">
+            <a:avLst/>
+          </a:prstGeom>
+          <a:noFill/>
+        </p:spPr>
+        <p:txBody>
+          <a:bodyPr wrap="square" rtlCol="0">
+            <a:spAutoFit/>
+          </a:bodyPr>
+          <a:lstStyle/>
+          <a:p>
+            <a:r>
+              <a:rPr lang="en-US" sz="1000" dirty="0">
+                <a:latin typeface="Arial" panose="020B0604020202020204" pitchFamily="34" charset="0"/>
+                <a:cs typeface="Arial" panose="020B0604020202020204" pitchFamily="34" charset="0"/>
+              </a:rPr>
+              <a:t>0.25</a:t>
+            </a:r>
+          </a:p>
+        </p:txBody>
+      </p:sp>
+      <p:sp>
+        <p:nvSpPr>
+          <p:cNvPr id="75" name="TextBox 74">
+            <a:extLst>
+              <a:ext uri="{FF2B5EF4-FFF2-40B4-BE49-F238E27FC236}">
+                <a16:creationId xmlns:a16="http://schemas.microsoft.com/office/drawing/2014/main" id="{14762026-02E5-BD66-564F-71791F8A96A6}"/>
+              </a:ext>
+            </a:extLst>
+          </p:cNvPr>
+          <p:cNvSpPr txBox="1"/>
+          <p:nvPr/>
+        </p:nvSpPr>
+        <p:spPr>
+          <a:xfrm>
+            <a:off x="5011831" y="3726243"/>
+            <a:ext cx="579603" cy="246221"/>
+          </a:xfrm>
+          <a:prstGeom prst="rect">
+            <a:avLst/>
+          </a:prstGeom>
+          <a:noFill/>
+        </p:spPr>
+        <p:txBody>
+          <a:bodyPr wrap="square" rtlCol="0">
+            <a:spAutoFit/>
+          </a:bodyPr>
+          <a:lstStyle/>
+          <a:p>
+            <a:r>
+              <a:rPr lang="en-US" sz="1000" dirty="0">
+                <a:latin typeface="Arial" panose="020B0604020202020204" pitchFamily="34" charset="0"/>
+                <a:cs typeface="Arial" panose="020B0604020202020204" pitchFamily="34" charset="0"/>
+              </a:rPr>
+              <a:t>0.50</a:t>
+            </a:r>
+          </a:p>
+        </p:txBody>
+      </p:sp>
+      <p:cxnSp>
+        <p:nvCxnSpPr>
+          <p:cNvPr id="77" name="Straight Connector 76">
+            <a:extLst>
+              <a:ext uri="{FF2B5EF4-FFF2-40B4-BE49-F238E27FC236}">
+                <a16:creationId xmlns:a16="http://schemas.microsoft.com/office/drawing/2014/main" id="{3676C8AB-D924-0869-E87A-08D0CD055964}"/>
+              </a:ext>
+            </a:extLst>
+          </p:cNvPr>
+          <p:cNvCxnSpPr>
+            <a:cxnSpLocks/>
+          </p:cNvCxnSpPr>
+          <p:nvPr/>
+        </p:nvCxnSpPr>
+        <p:spPr>
+          <a:xfrm>
+            <a:off x="6129791" y="3799843"/>
+            <a:ext cx="0" cy="243637"/>
+          </a:xfrm>
+          <a:prstGeom prst="line">
+            <a:avLst/>
+          </a:prstGeom>
+          <a:ln w="12700">
+            <a:solidFill>
+              <a:schemeClr val="tx1"/>
+            </a:solidFill>
+            <a:headEnd type="triangle" w="med" len="sm"/>
+            <a:tailEnd type="triangle" w="med" len="sm"/>
+          </a:ln>
+        </p:spPr>
+        <p:style>
+          <a:lnRef idx="2">
+            <a:schemeClr val="accent1"/>
+          </a:lnRef>
+          <a:fillRef idx="0">
+            <a:schemeClr val="accent1"/>
+          </a:fillRef>
+          <a:effectRef idx="1">
+            <a:schemeClr val="accent1"/>
+          </a:effectRef>
+          <a:fontRef idx="minor">
+            <a:schemeClr val="tx1"/>
+          </a:fontRef>
+        </p:style>
+      </p:cxnSp>
+      <p:cxnSp>
+        <p:nvCxnSpPr>
+          <p:cNvPr id="78" name="Straight Connector 77">
+            <a:extLst>
+              <a:ext uri="{FF2B5EF4-FFF2-40B4-BE49-F238E27FC236}">
+                <a16:creationId xmlns:a16="http://schemas.microsoft.com/office/drawing/2014/main" id="{EDAC7213-30BB-A942-5CA8-2DC8FBE33C20}"/>
+              </a:ext>
+            </a:extLst>
+          </p:cNvPr>
+          <p:cNvCxnSpPr>
+            <a:cxnSpLocks/>
+          </p:cNvCxnSpPr>
+          <p:nvPr/>
+        </p:nvCxnSpPr>
+        <p:spPr>
+          <a:xfrm>
+            <a:off x="5395398" y="3683459"/>
+            <a:ext cx="6604" cy="176155"/>
+          </a:xfrm>
+          <a:prstGeom prst="line">
+            <a:avLst/>
+          </a:prstGeom>
+          <a:ln w="12700">
+            <a:solidFill>
+              <a:schemeClr val="tx1"/>
+            </a:solidFill>
+            <a:headEnd type="triangle" w="med" len="sm"/>
+            <a:tailEnd type="triangle" w="med" len="sm"/>
+          </a:ln>
+        </p:spPr>
+        <p:style>
+          <a:lnRef idx="2">
+            <a:schemeClr val="accent1"/>
+          </a:lnRef>
+          <a:fillRef idx="0">
+            <a:schemeClr val="accent1"/>
+          </a:fillRef>
+          <a:effectRef idx="1">
+            <a:schemeClr val="accent1"/>
+          </a:effectRef>
+          <a:fontRef idx="minor">
+            <a:schemeClr val="tx1"/>
+          </a:fontRef>
+        </p:style>
+      </p:cxnSp>
+      <p:cxnSp>
+        <p:nvCxnSpPr>
+          <p:cNvPr id="80" name="Straight Connector 79">
+            <a:extLst>
+              <a:ext uri="{FF2B5EF4-FFF2-40B4-BE49-F238E27FC236}">
+                <a16:creationId xmlns:a16="http://schemas.microsoft.com/office/drawing/2014/main" id="{A0D39313-9F0D-F53C-0F0B-69C6B876F340}"/>
+              </a:ext>
+            </a:extLst>
+          </p:cNvPr>
+          <p:cNvCxnSpPr>
+            <a:cxnSpLocks/>
+          </p:cNvCxnSpPr>
+          <p:nvPr/>
+        </p:nvCxnSpPr>
+        <p:spPr>
+          <a:xfrm flipH="1">
+            <a:off x="6630135" y="4492688"/>
+            <a:ext cx="6605" cy="347855"/>
+          </a:xfrm>
+          <a:prstGeom prst="line">
+            <a:avLst/>
+          </a:prstGeom>
+          <a:ln w="12700">
+            <a:solidFill>
+              <a:schemeClr val="tx1"/>
+            </a:solidFill>
+            <a:headEnd type="triangle" w="med" len="sm"/>
+            <a:tailEnd type="triangle" w="med" len="sm"/>
+          </a:ln>
+        </p:spPr>
+        <p:style>
+          <a:lnRef idx="2">
+            <a:schemeClr val="accent1"/>
+          </a:lnRef>
+          <a:fillRef idx="0">
+            <a:schemeClr val="accent1"/>
+          </a:fillRef>
+          <a:effectRef idx="1">
+            <a:schemeClr val="accent1"/>
+          </a:effectRef>
+          <a:fontRef idx="minor">
+            <a:schemeClr val="tx1"/>
+          </a:fontRef>
+        </p:style>
+      </p:cxnSp>
+      <p:cxnSp>
+        <p:nvCxnSpPr>
+          <p:cNvPr id="81" name="Straight Connector 80">
+            <a:extLst>
+              <a:ext uri="{FF2B5EF4-FFF2-40B4-BE49-F238E27FC236}">
+                <a16:creationId xmlns:a16="http://schemas.microsoft.com/office/drawing/2014/main" id="{B707B062-2E64-5D32-0B5C-38A0A75B8F3F}"/>
+              </a:ext>
+            </a:extLst>
+          </p:cNvPr>
+          <p:cNvCxnSpPr>
+            <a:cxnSpLocks/>
+          </p:cNvCxnSpPr>
+          <p:nvPr/>
+        </p:nvCxnSpPr>
+        <p:spPr>
+          <a:xfrm>
+            <a:off x="6945263" y="5224035"/>
+            <a:ext cx="0" cy="197507"/>
+          </a:xfrm>
+          <a:prstGeom prst="line">
+            <a:avLst/>
+          </a:prstGeom>
+          <a:ln w="12700">
+            <a:solidFill>
+              <a:schemeClr val="tx1"/>
+            </a:solidFill>
+            <a:headEnd type="none" w="med" len="sm"/>
+            <a:tailEnd type="triangle" w="med" len="sm"/>
+          </a:ln>
+        </p:spPr>
+        <p:style>
+          <a:lnRef idx="2">
+            <a:schemeClr val="accent1"/>
+          </a:lnRef>
+          <a:fillRef idx="0">
+            <a:schemeClr val="accent1"/>
+          </a:fillRef>
+          <a:effectRef idx="1">
+            <a:schemeClr val="accent1"/>
+          </a:effectRef>
+          <a:fontRef idx="minor">
+            <a:schemeClr val="tx1"/>
+          </a:fontRef>
+        </p:style>
+      </p:cxnSp>
     </p:spTree>
     <p:extLst>
       <p:ext uri="{BB962C8B-B14F-4D97-AF65-F5344CB8AC3E}">
@@ -3511,4 +6533,319 @@
     </a:ext>
   </a:extLst>
 </a:theme>
+</file>
+
+<file path=ppt/theme/theme2.xml><?xml version="1.0" encoding="utf-8"?>
+<a:theme xmlns:a="http://schemas.openxmlformats.org/drawingml/2006/main" name="Office Theme">
+  <a:themeElements>
+    <a:clrScheme name="Office">
+      <a:dk1>
+        <a:sysClr val="windowText" lastClr="000000"/>
+      </a:dk1>
+      <a:lt1>
+        <a:sysClr val="window" lastClr="FFFFFF"/>
+      </a:lt1>
+      <a:dk2>
+        <a:srgbClr val="0E2841"/>
+      </a:dk2>
+      <a:lt2>
+        <a:srgbClr val="E8E8E8"/>
+      </a:lt2>
+      <a:accent1>
+        <a:srgbClr val="156082"/>
+      </a:accent1>
+      <a:accent2>
+        <a:srgbClr val="E97132"/>
+      </a:accent2>
+      <a:accent3>
+        <a:srgbClr val="196B24"/>
+      </a:accent3>
+      <a:accent4>
+        <a:srgbClr val="0F9ED5"/>
+      </a:accent4>
+      <a:accent5>
+        <a:srgbClr val="A02B93"/>
+      </a:accent5>
+      <a:accent6>
+        <a:srgbClr val="4EA72E"/>
+      </a:accent6>
+      <a:hlink>
+        <a:srgbClr val="467886"/>
+      </a:hlink>
+      <a:folHlink>
+        <a:srgbClr val="96607D"/>
+      </a:folHlink>
+    </a:clrScheme>
+    <a:fontScheme name="Office">
+      <a:majorFont>
+        <a:latin typeface="Aptos Display" panose="02110004020202020204"/>
+        <a:ea typeface=""/>
+        <a:cs typeface=""/>
+        <a:font script="Jpan" typeface="游ゴシック Light"/>
+        <a:font script="Hang" typeface="맑은 고딕"/>
+        <a:font script="Hans" typeface="等线 Light"/>
+        <a:font script="Hant" typeface="新細明體"/>
+        <a:font script="Arab" typeface="Times New Roman"/>
+        <a:font script="Hebr" typeface="Times New Roman"/>
+        <a:font script="Thai" typeface="Angsana New"/>
+        <a:font script="Ethi" typeface="Nyala"/>
+        <a:font script="Beng" typeface="Vrinda"/>
+        <a:font script="Gujr" typeface="Shruti"/>
+        <a:font script="Khmr" typeface="MoolBoran"/>
+        <a:font script="Knda" typeface="Tunga"/>
+        <a:font script="Guru" typeface="Raavi"/>
+        <a:font script="Cans" typeface="Euphemia"/>
+        <a:font script="Cher" typeface="Plantagenet Cherokee"/>
+        <a:font script="Yiii" typeface="Microsoft Yi Baiti"/>
+        <a:font script="Tibt" typeface="Microsoft Himalaya"/>
+        <a:font script="Thaa" typeface="MV Boli"/>
+        <a:font script="Deva" typeface="Mangal"/>
+        <a:font script="Telu" typeface="Gautami"/>
+        <a:font script="Taml" typeface="Latha"/>
+        <a:font script="Syrc" typeface="Estrangelo Edessa"/>
+        <a:font script="Orya" typeface="Kalinga"/>
+        <a:font script="Mlym" typeface="Kartika"/>
+        <a:font script="Laoo" typeface="DokChampa"/>
+        <a:font script="Sinh" typeface="Iskoola Pota"/>
+        <a:font script="Mong" typeface="Mongolian Baiti"/>
+        <a:font script="Viet" typeface="Times New Roman"/>
+        <a:font script="Uigh" typeface="Microsoft Uighur"/>
+        <a:font script="Geor" typeface="Sylfaen"/>
+        <a:font script="Armn" typeface="Arial"/>
+        <a:font script="Bugi" typeface="Leelawadee UI"/>
+        <a:font script="Bopo" typeface="Microsoft JhengHei"/>
+        <a:font script="Java" typeface="Javanese Text"/>
+        <a:font script="Lisu" typeface="Segoe UI"/>
+        <a:font script="Mymr" typeface="Myanmar Text"/>
+        <a:font script="Nkoo" typeface="Ebrima"/>
+        <a:font script="Olck" typeface="Nirmala UI"/>
+        <a:font script="Osma" typeface="Ebrima"/>
+        <a:font script="Phag" typeface="Phagspa"/>
+        <a:font script="Syrn" typeface="Estrangelo Edessa"/>
+        <a:font script="Syrj" typeface="Estrangelo Edessa"/>
+        <a:font script="Syre" typeface="Estrangelo Edessa"/>
+        <a:font script="Sora" typeface="Nirmala UI"/>
+        <a:font script="Tale" typeface="Microsoft Tai Le"/>
+        <a:font script="Talu" typeface="Microsoft New Tai Lue"/>
+        <a:font script="Tfng" typeface="Ebrima"/>
+      </a:majorFont>
+      <a:minorFont>
+        <a:latin typeface="Aptos" panose="02110004020202020204"/>
+        <a:ea typeface=""/>
+        <a:cs typeface=""/>
+        <a:font script="Jpan" typeface="游ゴシック"/>
+        <a:font script="Hang" typeface="맑은 고딕"/>
+        <a:font script="Hans" typeface="等线"/>
+        <a:font script="Hant" typeface="新細明體"/>
+        <a:font script="Arab" typeface="Arial"/>
+        <a:font script="Hebr" typeface="Arial"/>
+        <a:font script="Thai" typeface="Cordia New"/>
+        <a:font script="Ethi" typeface="Nyala"/>
+        <a:font script="Beng" typeface="Vrinda"/>
+        <a:font script="Gujr" typeface="Shruti"/>
+        <a:font script="Khmr" typeface="DaunPenh"/>
+        <a:font script="Knda" typeface="Tunga"/>
+        <a:font script="Guru" typeface="Raavi"/>
+        <a:font script="Cans" typeface="Euphemia"/>
+        <a:font script="Cher" typeface="Plantagenet Cherokee"/>
+        <a:font script="Yiii" typeface="Microsoft Yi Baiti"/>
+        <a:font script="Tibt" typeface="Microsoft Himalaya"/>
+        <a:font script="Thaa" typeface="MV Boli"/>
+        <a:font script="Deva" typeface="Mangal"/>
+        <a:font script="Telu" typeface="Gautami"/>
+        <a:font script="Taml" typeface="Latha"/>
+        <a:font script="Syrc" typeface="Estrangelo Edessa"/>
+        <a:font script="Orya" typeface="Kalinga"/>
+        <a:font script="Mlym" typeface="Kartika"/>
+        <a:font script="Laoo" typeface="DokChampa"/>
+        <a:font script="Sinh" typeface="Iskoola Pota"/>
+        <a:font script="Mong" typeface="Mongolian Baiti"/>
+        <a:font script="Viet" typeface="Arial"/>
+        <a:font script="Uigh" typeface="Microsoft Uighur"/>
+        <a:font script="Geor" typeface="Sylfaen"/>
+        <a:font script="Armn" typeface="Arial"/>
+        <a:font script="Bugi" typeface="Leelawadee UI"/>
+        <a:font script="Bopo" typeface="Microsoft JhengHei"/>
+        <a:font script="Java" typeface="Javanese Text"/>
+        <a:font script="Lisu" typeface="Segoe UI"/>
+        <a:font script="Mymr" typeface="Myanmar Text"/>
+        <a:font script="Nkoo" typeface="Ebrima"/>
+        <a:font script="Olck" typeface="Nirmala UI"/>
+        <a:font script="Osma" typeface="Ebrima"/>
+        <a:font script="Phag" typeface="Phagspa"/>
+        <a:font script="Syrn" typeface="Estrangelo Edessa"/>
+        <a:font script="Syrj" typeface="Estrangelo Edessa"/>
+        <a:font script="Syre" typeface="Estrangelo Edessa"/>
+        <a:font script="Sora" typeface="Nirmala UI"/>
+        <a:font script="Tale" typeface="Microsoft Tai Le"/>
+        <a:font script="Talu" typeface="Microsoft New Tai Lue"/>
+        <a:font script="Tfng" typeface="Ebrima"/>
+      </a:minorFont>
+    </a:fontScheme>
+    <a:fmtScheme name="Office">
+      <a:fillStyleLst>
+        <a:solidFill>
+          <a:schemeClr val="phClr"/>
+        </a:solidFill>
+        <a:gradFill rotWithShape="1">
+          <a:gsLst>
+            <a:gs pos="0">
+              <a:schemeClr val="phClr">
+                <a:lumMod val="110000"/>
+                <a:satMod val="105000"/>
+                <a:tint val="67000"/>
+              </a:schemeClr>
+            </a:gs>
+            <a:gs pos="50000">
+              <a:schemeClr val="phClr">
+                <a:lumMod val="105000"/>
+                <a:satMod val="103000"/>
+                <a:tint val="73000"/>
+              </a:schemeClr>
+            </a:gs>
+            <a:gs pos="100000">
+              <a:schemeClr val="phClr">
+                <a:lumMod val="105000"/>
+                <a:satMod val="109000"/>
+                <a:tint val="81000"/>
+              </a:schemeClr>
+            </a:gs>
+          </a:gsLst>
+          <a:lin ang="5400000" scaled="0"/>
+        </a:gradFill>
+        <a:gradFill rotWithShape="1">
+          <a:gsLst>
+            <a:gs pos="0">
+              <a:schemeClr val="phClr">
+                <a:satMod val="103000"/>
+                <a:lumMod val="102000"/>
+                <a:tint val="94000"/>
+              </a:schemeClr>
+            </a:gs>
+            <a:gs pos="50000">
+              <a:schemeClr val="phClr">
+                <a:satMod val="110000"/>
+                <a:lumMod val="100000"/>
+                <a:shade val="100000"/>
+              </a:schemeClr>
+            </a:gs>
+            <a:gs pos="100000">
+              <a:schemeClr val="phClr">
+                <a:lumMod val="99000"/>
+                <a:satMod val="120000"/>
+                <a:shade val="78000"/>
+              </a:schemeClr>
+            </a:gs>
+          </a:gsLst>
+          <a:lin ang="5400000" scaled="0"/>
+        </a:gradFill>
+      </a:fillStyleLst>
+      <a:lnStyleLst>
+        <a:ln w="12700" cap="flat" cmpd="sng" algn="ctr">
+          <a:solidFill>
+            <a:schemeClr val="phClr"/>
+          </a:solidFill>
+          <a:prstDash val="solid"/>
+          <a:miter lim="800000"/>
+        </a:ln>
+        <a:ln w="19050" cap="flat" cmpd="sng" algn="ctr">
+          <a:solidFill>
+            <a:schemeClr val="phClr"/>
+          </a:solidFill>
+          <a:prstDash val="solid"/>
+          <a:miter lim="800000"/>
+        </a:ln>
+        <a:ln w="25400" cap="flat" cmpd="sng" algn="ctr">
+          <a:solidFill>
+            <a:schemeClr val="phClr"/>
+          </a:solidFill>
+          <a:prstDash val="solid"/>
+          <a:miter lim="800000"/>
+        </a:ln>
+      </a:lnStyleLst>
+      <a:effectStyleLst>
+        <a:effectStyle>
+          <a:effectLst/>
+        </a:effectStyle>
+        <a:effectStyle>
+          <a:effectLst/>
+        </a:effectStyle>
+        <a:effectStyle>
+          <a:effectLst>
+            <a:outerShdw blurRad="57150" dist="19050" dir="5400000" algn="ctr" rotWithShape="0">
+              <a:srgbClr val="000000">
+                <a:alpha val="63000"/>
+              </a:srgbClr>
+            </a:outerShdw>
+          </a:effectLst>
+        </a:effectStyle>
+      </a:effectStyleLst>
+      <a:bgFillStyleLst>
+        <a:solidFill>
+          <a:schemeClr val="phClr"/>
+        </a:solidFill>
+        <a:solidFill>
+          <a:schemeClr val="phClr">
+            <a:tint val="95000"/>
+            <a:satMod val="170000"/>
+          </a:schemeClr>
+        </a:solidFill>
+        <a:gradFill rotWithShape="1">
+          <a:gsLst>
+            <a:gs pos="0">
+              <a:schemeClr val="phClr">
+                <a:tint val="93000"/>
+                <a:satMod val="150000"/>
+                <a:shade val="98000"/>
+                <a:lumMod val="102000"/>
+              </a:schemeClr>
+            </a:gs>
+            <a:gs pos="50000">
+              <a:schemeClr val="phClr">
+                <a:tint val="98000"/>
+                <a:satMod val="130000"/>
+                <a:shade val="90000"/>
+                <a:lumMod val="103000"/>
+              </a:schemeClr>
+            </a:gs>
+            <a:gs pos="100000">
+              <a:schemeClr val="phClr">
+                <a:shade val="63000"/>
+                <a:satMod val="120000"/>
+              </a:schemeClr>
+            </a:gs>
+          </a:gsLst>
+          <a:lin ang="5400000" scaled="0"/>
+        </a:gradFill>
+      </a:bgFillStyleLst>
+    </a:fmtScheme>
+  </a:themeElements>
+  <a:objectDefaults>
+    <a:lnDef>
+      <a:spPr/>
+      <a:bodyPr/>
+      <a:lstStyle/>
+      <a:style>
+        <a:lnRef idx="2">
+          <a:schemeClr val="accent1"/>
+        </a:lnRef>
+        <a:fillRef idx="0">
+          <a:schemeClr val="accent1"/>
+        </a:fillRef>
+        <a:effectRef idx="1">
+          <a:schemeClr val="accent1"/>
+        </a:effectRef>
+        <a:fontRef idx="minor">
+          <a:schemeClr val="tx1"/>
+        </a:fontRef>
+      </a:style>
+    </a:lnDef>
+  </a:objectDefaults>
+  <a:extraClrSchemeLst/>
+  <a:extLst>
+    <a:ext uri="{05A4C25C-085E-4340-85A3-A5531E510DB2}">
+      <thm15:themeFamily xmlns:thm15="http://schemas.microsoft.com/office/thememl/2012/main" name="Office Theme" id="{2E142A2C-CD16-42D6-873A-C26D2A0506FA}" vid="{1BDDFF52-6CD6-40A5-AB3C-68EB2F1E4D0A}"/>
+    </a:ext>
+  </a:extLst>
+</a:theme>
 </file>
</xml_diff>